<commit_message>
Sprint 3 planning powerpoint
</commit_message>
<xml_diff>
--- a/Documentation/Sprint 3/Sprint 2 meeting.pptx
+++ b/Documentation/Sprint 3/Sprint 2 meeting.pptx
@@ -5,10 +5,18 @@
     <p:sldMasterId id="2147483672" r:id="rId1"/>
   </p:sldMasterIdLst>
   <p:notesMasterIdLst>
-    <p:notesMasterId r:id="rId3"/>
+    <p:notesMasterId r:id="rId11"/>
   </p:notesMasterIdLst>
   <p:sldIdLst>
     <p:sldId id="282" r:id="rId2"/>
+    <p:sldId id="283" r:id="rId3"/>
+    <p:sldId id="284" r:id="rId4"/>
+    <p:sldId id="285" r:id="rId5"/>
+    <p:sldId id="286" r:id="rId6"/>
+    <p:sldId id="288" r:id="rId7"/>
+    <p:sldId id="289" r:id="rId8"/>
+    <p:sldId id="291" r:id="rId9"/>
+    <p:sldId id="292" r:id="rId10"/>
   </p:sldIdLst>
   <p:sldSz cx="9144000" cy="6858000" type="screen4x3"/>
   <p:notesSz cx="6858000" cy="9144000"/>
@@ -109,7 +117,7 @@
   </p:defaultTextStyle>
   <p:extLst>
     <p:ext uri="{EFAFB233-063F-42B5-8137-9DF3F51BA10A}">
-      <p15:sldGuideLst xmlns:p15="http://schemas.microsoft.com/office/powerpoint/2012/main" xmlns="">
+      <p15:sldGuideLst xmlns="" xmlns:p15="http://schemas.microsoft.com/office/powerpoint/2012/main">
         <p15:guide id="1" orient="horz" pos="2160">
           <p15:clr>
             <a:srgbClr val="A4A3A4"/>
@@ -208,7 +216,7 @@
           <a:p>
             <a:fld id="{501F084D-6B10-4CC7-A9E9-E3312C51CBCE}" type="datetimeFigureOut">
               <a:rPr lang="en-US" smtClean="0"/>
-              <a:t>10/30/2018</a:t>
+              <a:t>10/31/2018</a:t>
             </a:fld>
             <a:endParaRPr lang="en-US"/>
           </a:p>
@@ -474,6 +482,174 @@
     </a:lvl9pPr>
   </p:notesStyle>
 </p:notesMaster>
+</file>
+
+<file path=ppt/notesSlides/notesSlide1.xml><?xml version="1.0" encoding="utf-8"?>
+<p:notes xmlns:a="http://schemas.openxmlformats.org/drawingml/2006/main" xmlns:r="http://schemas.openxmlformats.org/officeDocument/2006/relationships" xmlns:p="http://schemas.openxmlformats.org/presentationml/2006/main">
+  <p:cSld>
+    <p:spTree>
+      <p:nvGrpSpPr>
+        <p:cNvPr id="1" name=""/>
+        <p:cNvGrpSpPr/>
+        <p:nvPr/>
+      </p:nvGrpSpPr>
+      <p:grpSpPr>
+        <a:xfrm>
+          <a:off x="0" y="0"/>
+          <a:ext cx="0" cy="0"/>
+          <a:chOff x="0" y="0"/>
+          <a:chExt cx="0" cy="0"/>
+        </a:xfrm>
+      </p:grpSpPr>
+      <p:sp>
+        <p:nvSpPr>
+          <p:cNvPr id="2" name="Slide Image Placeholder 1"/>
+          <p:cNvSpPr>
+            <a:spLocks noGrp="1" noRot="1" noChangeAspect="1"/>
+          </p:cNvSpPr>
+          <p:nvPr>
+            <p:ph type="sldImg"/>
+          </p:nvPr>
+        </p:nvSpPr>
+        <p:spPr/>
+      </p:sp>
+      <p:sp>
+        <p:nvSpPr>
+          <p:cNvPr id="3" name="Notes Placeholder 2"/>
+          <p:cNvSpPr>
+            <a:spLocks noGrp="1"/>
+          </p:cNvSpPr>
+          <p:nvPr>
+            <p:ph type="body" idx="1"/>
+          </p:nvPr>
+        </p:nvSpPr>
+        <p:spPr/>
+        <p:txBody>
+          <a:bodyPr/>
+          <a:lstStyle/>
+          <a:p>
+            <a:endParaRPr lang="en-US" dirty="0"/>
+          </a:p>
+        </p:txBody>
+      </p:sp>
+      <p:sp>
+        <p:nvSpPr>
+          <p:cNvPr id="4" name="Slide Number Placeholder 3"/>
+          <p:cNvSpPr>
+            <a:spLocks noGrp="1"/>
+          </p:cNvSpPr>
+          <p:nvPr>
+            <p:ph type="sldNum" sz="quarter" idx="10"/>
+          </p:nvPr>
+        </p:nvSpPr>
+        <p:spPr/>
+        <p:txBody>
+          <a:bodyPr/>
+          <a:lstStyle/>
+          <a:p>
+            <a:fld id="{BD688E8D-ED66-467E-BFB1-71B64E19C583}" type="slidenum">
+              <a:rPr lang="en-US" smtClean="0"/>
+              <a:t>6</a:t>
+            </a:fld>
+            <a:endParaRPr lang="en-US"/>
+          </a:p>
+        </p:txBody>
+      </p:sp>
+    </p:spTree>
+    <p:extLst>
+      <p:ext uri="{BB962C8B-B14F-4D97-AF65-F5344CB8AC3E}">
+        <p14:creationId xmlns:p14="http://schemas.microsoft.com/office/powerpoint/2010/main" val="3839567954"/>
+      </p:ext>
+    </p:extLst>
+  </p:cSld>
+  <p:clrMapOvr>
+    <a:masterClrMapping/>
+  </p:clrMapOvr>
+</p:notes>
+</file>
+
+<file path=ppt/notesSlides/notesSlide2.xml><?xml version="1.0" encoding="utf-8"?>
+<p:notes xmlns:a="http://schemas.openxmlformats.org/drawingml/2006/main" xmlns:r="http://schemas.openxmlformats.org/officeDocument/2006/relationships" xmlns:p="http://schemas.openxmlformats.org/presentationml/2006/main">
+  <p:cSld>
+    <p:spTree>
+      <p:nvGrpSpPr>
+        <p:cNvPr id="1" name=""/>
+        <p:cNvGrpSpPr/>
+        <p:nvPr/>
+      </p:nvGrpSpPr>
+      <p:grpSpPr>
+        <a:xfrm>
+          <a:off x="0" y="0"/>
+          <a:ext cx="0" cy="0"/>
+          <a:chOff x="0" y="0"/>
+          <a:chExt cx="0" cy="0"/>
+        </a:xfrm>
+      </p:grpSpPr>
+      <p:sp>
+        <p:nvSpPr>
+          <p:cNvPr id="2" name="Slide Image Placeholder 1"/>
+          <p:cNvSpPr>
+            <a:spLocks noGrp="1" noRot="1" noChangeAspect="1"/>
+          </p:cNvSpPr>
+          <p:nvPr>
+            <p:ph type="sldImg"/>
+          </p:nvPr>
+        </p:nvSpPr>
+        <p:spPr/>
+      </p:sp>
+      <p:sp>
+        <p:nvSpPr>
+          <p:cNvPr id="3" name="Notes Placeholder 2"/>
+          <p:cNvSpPr>
+            <a:spLocks noGrp="1"/>
+          </p:cNvSpPr>
+          <p:nvPr>
+            <p:ph type="body" idx="1"/>
+          </p:nvPr>
+        </p:nvSpPr>
+        <p:spPr/>
+        <p:txBody>
+          <a:bodyPr/>
+          <a:lstStyle/>
+          <a:p>
+            <a:endParaRPr lang="en-US" dirty="0"/>
+          </a:p>
+        </p:txBody>
+      </p:sp>
+      <p:sp>
+        <p:nvSpPr>
+          <p:cNvPr id="4" name="Slide Number Placeholder 3"/>
+          <p:cNvSpPr>
+            <a:spLocks noGrp="1"/>
+          </p:cNvSpPr>
+          <p:nvPr>
+            <p:ph type="sldNum" sz="quarter" idx="10"/>
+          </p:nvPr>
+        </p:nvSpPr>
+        <p:spPr/>
+        <p:txBody>
+          <a:bodyPr/>
+          <a:lstStyle/>
+          <a:p>
+            <a:fld id="{BD688E8D-ED66-467E-BFB1-71B64E19C583}" type="slidenum">
+              <a:rPr lang="en-US" smtClean="0"/>
+              <a:t>7</a:t>
+            </a:fld>
+            <a:endParaRPr lang="en-US"/>
+          </a:p>
+        </p:txBody>
+      </p:sp>
+    </p:spTree>
+    <p:extLst>
+      <p:ext uri="{BB962C8B-B14F-4D97-AF65-F5344CB8AC3E}">
+        <p14:creationId xmlns:p14="http://schemas.microsoft.com/office/powerpoint/2010/main" val="3839567954"/>
+      </p:ext>
+    </p:extLst>
+  </p:cSld>
+  <p:clrMapOvr>
+    <a:masterClrMapping/>
+  </p:clrMapOvr>
+</p:notes>
 </file>
 
 <file path=ppt/slideLayouts/slideLayout1.xml><?xml version="1.0" encoding="utf-8"?>
@@ -765,7 +941,7 @@
           <a:p>
             <a:fld id="{CBA7BE7B-3410-4E87-9771-CD578C0C6658}" type="datetimeFigureOut">
               <a:rPr lang="en-US" smtClean="0"/>
-              <a:t>10/30/2018</a:t>
+              <a:t>10/31/2018</a:t>
             </a:fld>
             <a:endParaRPr lang="en-US"/>
           </a:p>
@@ -1196,7 +1372,7 @@
           <a:p>
             <a:fld id="{CBA7BE7B-3410-4E87-9771-CD578C0C6658}" type="datetimeFigureOut">
               <a:rPr lang="en-US" smtClean="0"/>
-              <a:t>10/30/2018</a:t>
+              <a:t>10/31/2018</a:t>
             </a:fld>
             <a:endParaRPr lang="en-US"/>
           </a:p>
@@ -1371,7 +1547,7 @@
           <a:p>
             <a:fld id="{CBA7BE7B-3410-4E87-9771-CD578C0C6658}" type="datetimeFigureOut">
               <a:rPr lang="en-US" smtClean="0"/>
-              <a:t>10/30/2018</a:t>
+              <a:t>10/31/2018</a:t>
             </a:fld>
             <a:endParaRPr lang="en-US"/>
           </a:p>
@@ -1562,7 +1738,7 @@
           <a:p>
             <a:fld id="{CBA7BE7B-3410-4E87-9771-CD578C0C6658}" type="datetimeFigureOut">
               <a:rPr lang="en-US" smtClean="0"/>
-              <a:t>10/30/2018</a:t>
+              <a:t>10/31/2018</a:t>
             </a:fld>
             <a:endParaRPr lang="en-US"/>
           </a:p>
@@ -1926,7 +2102,7 @@
           <a:p>
             <a:fld id="{CBA7BE7B-3410-4E87-9771-CD578C0C6658}" type="datetimeFigureOut">
               <a:rPr lang="en-US" smtClean="0"/>
-              <a:t>10/30/2018</a:t>
+              <a:t>10/31/2018</a:t>
             </a:fld>
             <a:endParaRPr lang="en-US"/>
           </a:p>
@@ -2391,7 +2567,7 @@
           <a:p>
             <a:fld id="{CBA7BE7B-3410-4E87-9771-CD578C0C6658}" type="datetimeFigureOut">
               <a:rPr lang="en-US" smtClean="0"/>
-              <a:t>10/30/2018</a:t>
+              <a:t>10/31/2018</a:t>
             </a:fld>
             <a:endParaRPr lang="en-US"/>
           </a:p>
@@ -2908,7 +3084,7 @@
           <a:p>
             <a:fld id="{CBA7BE7B-3410-4E87-9771-CD578C0C6658}" type="datetimeFigureOut">
               <a:rPr lang="en-US" smtClean="0"/>
-              <a:t>10/30/2018</a:t>
+              <a:t>10/31/2018</a:t>
             </a:fld>
             <a:endParaRPr lang="en-US"/>
           </a:p>
@@ -3028,7 +3204,7 @@
           <a:p>
             <a:fld id="{CBA7BE7B-3410-4E87-9771-CD578C0C6658}" type="datetimeFigureOut">
               <a:rPr lang="en-US" smtClean="0"/>
-              <a:t>10/30/2018</a:t>
+              <a:t>10/31/2018</a:t>
             </a:fld>
             <a:endParaRPr lang="en-US"/>
           </a:p>
@@ -3125,7 +3301,7 @@
           <a:p>
             <a:fld id="{CBA7BE7B-3410-4E87-9771-CD578C0C6658}" type="datetimeFigureOut">
               <a:rPr lang="en-US" smtClean="0"/>
-              <a:t>10/30/2018</a:t>
+              <a:t>10/31/2018</a:t>
             </a:fld>
             <a:endParaRPr lang="en-US"/>
           </a:p>
@@ -3555,7 +3731,7 @@
           <a:p>
             <a:fld id="{CBA7BE7B-3410-4E87-9771-CD578C0C6658}" type="datetimeFigureOut">
               <a:rPr lang="en-US" smtClean="0"/>
-              <a:t>10/30/2018</a:t>
+              <a:t>10/31/2018</a:t>
             </a:fld>
             <a:endParaRPr lang="en-US"/>
           </a:p>
@@ -4088,7 +4264,7 @@
           <a:p>
             <a:fld id="{CBA7BE7B-3410-4E87-9771-CD578C0C6658}" type="datetimeFigureOut">
               <a:rPr lang="en-US" smtClean="0"/>
-              <a:t>10/30/2018</a:t>
+              <a:t>10/31/2018</a:t>
             </a:fld>
             <a:endParaRPr lang="en-US"/>
           </a:p>
@@ -4928,7 +5104,7 @@
           <a:p>
             <a:fld id="{CBA7BE7B-3410-4E87-9771-CD578C0C6658}" type="datetimeFigureOut">
               <a:rPr lang="en-US" smtClean="0"/>
-              <a:t>10/30/2018</a:t>
+              <a:t>10/31/2018</a:t>
             </a:fld>
             <a:endParaRPr lang="en-US"/>
           </a:p>
@@ -5350,12 +5526,40 @@
             <p:ph type="ctrTitle"/>
           </p:nvPr>
         </p:nvSpPr>
-        <p:spPr/>
+        <p:spPr>
+          <a:xfrm>
+            <a:off x="838200" y="914400"/>
+            <a:ext cx="5449490" cy="1737706"/>
+          </a:xfrm>
+        </p:spPr>
         <p:txBody>
           <a:bodyPr/>
           <a:lstStyle/>
           <a:p>
-            <a:endParaRPr lang="en-US"/>
+            <a:r>
+              <a:rPr lang="en-US" dirty="0" smtClean="0">
+                <a:latin typeface="Calibri" panose="020F0502020204030204" pitchFamily="34" charset="0"/>
+                <a:cs typeface="Calibri" panose="020F0502020204030204" pitchFamily="34" charset="0"/>
+              </a:rPr>
+              <a:t>Sprint 3</a:t>
+            </a:r>
+            <a:br>
+              <a:rPr lang="en-US" dirty="0" smtClean="0">
+                <a:latin typeface="Calibri" panose="020F0502020204030204" pitchFamily="34" charset="0"/>
+                <a:cs typeface="Calibri" panose="020F0502020204030204" pitchFamily="34" charset="0"/>
+              </a:rPr>
+            </a:br>
+            <a:r>
+              <a:rPr lang="en-US" dirty="0" smtClean="0">
+                <a:latin typeface="Calibri" panose="020F0502020204030204" pitchFamily="34" charset="0"/>
+                <a:cs typeface="Calibri" panose="020F0502020204030204" pitchFamily="34" charset="0"/>
+              </a:rPr>
+              <a:t>planning </a:t>
+            </a:r>
+            <a:endParaRPr lang="en-US" dirty="0">
+              <a:latin typeface="Calibri" panose="020F0502020204030204" pitchFamily="34" charset="0"/>
+              <a:cs typeface="Calibri" panose="020F0502020204030204" pitchFamily="34" charset="0"/>
+            </a:endParaRPr>
           </a:p>
         </p:txBody>
       </p:sp>
@@ -5369,12 +5573,33 @@
             <p:ph type="subTitle" idx="1"/>
           </p:nvPr>
         </p:nvSpPr>
-        <p:spPr/>
+        <p:spPr>
+          <a:xfrm>
+            <a:off x="3886200" y="5029200"/>
+            <a:ext cx="4615656" cy="685800"/>
+          </a:xfrm>
+        </p:spPr>
         <p:txBody>
           <a:bodyPr/>
           <a:lstStyle/>
           <a:p>
-            <a:endParaRPr lang="en-US"/>
+            <a:r>
+              <a:rPr lang="en-US" dirty="0" smtClean="0">
+                <a:solidFill>
+                  <a:schemeClr val="bg1"/>
+                </a:solidFill>
+                <a:latin typeface="Calibri" panose="020F0502020204030204" pitchFamily="34" charset="0"/>
+                <a:cs typeface="Calibri" panose="020F0502020204030204" pitchFamily="34" charset="0"/>
+              </a:rPr>
+              <a:t>Team sixteen - Intern</a:t>
+            </a:r>
+            <a:endParaRPr lang="en-US" dirty="0">
+              <a:solidFill>
+                <a:schemeClr val="bg1"/>
+              </a:solidFill>
+              <a:latin typeface="Calibri" panose="020F0502020204030204" pitchFamily="34" charset="0"/>
+              <a:cs typeface="Calibri" panose="020F0502020204030204" pitchFamily="34" charset="0"/>
+            </a:endParaRPr>
           </a:p>
         </p:txBody>
       </p:sp>
@@ -5388,6 +5613,2555 @@
   <p:clrMapOvr>
     <a:masterClrMapping/>
   </p:clrMapOvr>
+  <p:timing>
+    <p:tnLst>
+      <p:par>
+        <p:cTn id="1" dur="indefinite" restart="never" nodeType="tmRoot"/>
+      </p:par>
+    </p:tnLst>
+  </p:timing>
+</p:sld>
+</file>
+
+<file path=ppt/slides/slide2.xml><?xml version="1.0" encoding="utf-8"?>
+<p:sld xmlns:a="http://schemas.openxmlformats.org/drawingml/2006/main" xmlns:r="http://schemas.openxmlformats.org/officeDocument/2006/relationships" xmlns:p="http://schemas.openxmlformats.org/presentationml/2006/main" showMasterSp="0">
+  <p:cSld>
+    <p:spTree>
+      <p:nvGrpSpPr>
+        <p:cNvPr id="1" name=""/>
+        <p:cNvGrpSpPr/>
+        <p:nvPr/>
+      </p:nvGrpSpPr>
+      <p:grpSpPr>
+        <a:xfrm>
+          <a:off x="0" y="0"/>
+          <a:ext cx="0" cy="0"/>
+          <a:chOff x="0" y="0"/>
+          <a:chExt cx="0" cy="0"/>
+        </a:xfrm>
+      </p:grpSpPr>
+      <p:sp>
+        <p:nvSpPr>
+          <p:cNvPr id="3" name="TextBox 2"/>
+          <p:cNvSpPr txBox="1"/>
+          <p:nvPr/>
+        </p:nvSpPr>
+        <p:spPr>
+          <a:xfrm>
+            <a:off x="0" y="0"/>
+            <a:ext cx="9144000" cy="584775"/>
+          </a:xfrm>
+          <a:prstGeom prst="rect">
+            <a:avLst/>
+          </a:prstGeom>
+          <a:solidFill>
+            <a:schemeClr val="accent1">
+              <a:lumMod val="20000"/>
+              <a:lumOff val="80000"/>
+            </a:schemeClr>
+          </a:solidFill>
+        </p:spPr>
+        <p:txBody>
+          <a:bodyPr wrap="square" rtlCol="0">
+            <a:spAutoFit/>
+          </a:bodyPr>
+          <a:lstStyle/>
+          <a:p>
+            <a:pPr algn="ctr"/>
+            <a:r>
+              <a:rPr lang="en-US" sz="3200" b="1" dirty="0" smtClean="0">
+                <a:latin typeface="Calibri" panose="020F0502020204030204" pitchFamily="34" charset="0"/>
+                <a:cs typeface="Calibri" panose="020F0502020204030204" pitchFamily="34" charset="0"/>
+              </a:rPr>
+              <a:t>CONTENTS</a:t>
+            </a:r>
+            <a:endParaRPr lang="en-US" sz="3200" b="1" dirty="0">
+              <a:latin typeface="Calibri" panose="020F0502020204030204" pitchFamily="34" charset="0"/>
+              <a:cs typeface="Calibri" panose="020F0502020204030204" pitchFamily="34" charset="0"/>
+            </a:endParaRPr>
+          </a:p>
+        </p:txBody>
+      </p:sp>
+      <p:grpSp>
+        <p:nvGrpSpPr>
+          <p:cNvPr id="10" name="Group 9"/>
+          <p:cNvGrpSpPr/>
+          <p:nvPr/>
+        </p:nvGrpSpPr>
+        <p:grpSpPr>
+          <a:xfrm>
+            <a:off x="990600" y="1676400"/>
+            <a:ext cx="2767445" cy="4119880"/>
+            <a:chOff x="990600" y="1676400"/>
+            <a:chExt cx="2767445" cy="4119880"/>
+          </a:xfrm>
+        </p:grpSpPr>
+        <p:sp>
+          <p:nvSpPr>
+            <p:cNvPr id="4" name="Rectangle 3"/>
+            <p:cNvSpPr/>
+            <p:nvPr/>
+          </p:nvSpPr>
+          <p:spPr>
+            <a:xfrm>
+              <a:off x="990600" y="1676400"/>
+              <a:ext cx="2767445" cy="3281680"/>
+            </a:xfrm>
+            <a:prstGeom prst="rect">
+              <a:avLst/>
+            </a:prstGeom>
+            <a:solidFill>
+              <a:schemeClr val="accent2">
+                <a:lumMod val="60000"/>
+                <a:lumOff val="40000"/>
+              </a:schemeClr>
+            </a:solidFill>
+            <a:ln>
+              <a:noFill/>
+            </a:ln>
+          </p:spPr>
+          <p:style>
+            <a:lnRef idx="2">
+              <a:schemeClr val="accent1">
+                <a:shade val="50000"/>
+              </a:schemeClr>
+            </a:lnRef>
+            <a:fillRef idx="1">
+              <a:schemeClr val="accent1"/>
+            </a:fillRef>
+            <a:effectRef idx="0">
+              <a:schemeClr val="accent1"/>
+            </a:effectRef>
+            <a:fontRef idx="minor">
+              <a:schemeClr val="lt1"/>
+            </a:fontRef>
+          </p:style>
+          <p:txBody>
+            <a:bodyPr rtlCol="0" anchor="ctr"/>
+            <a:lstStyle/>
+            <a:p>
+              <a:pPr algn="ctr"/>
+              <a:r>
+                <a:rPr lang="en-US" sz="4400" dirty="0" smtClean="0">
+                  <a:latin typeface="Calibri" panose="020F0502020204030204" pitchFamily="34" charset="0"/>
+                  <a:cs typeface="Calibri" panose="020F0502020204030204" pitchFamily="34" charset="0"/>
+                </a:rPr>
+                <a:t>Sprint goals</a:t>
+              </a:r>
+              <a:endParaRPr lang="en-US" sz="4400" dirty="0">
+                <a:latin typeface="Calibri" panose="020F0502020204030204" pitchFamily="34" charset="0"/>
+                <a:cs typeface="Calibri" panose="020F0502020204030204" pitchFamily="34" charset="0"/>
+              </a:endParaRPr>
+            </a:p>
+          </p:txBody>
+        </p:sp>
+        <p:sp>
+          <p:nvSpPr>
+            <p:cNvPr id="9" name="Rectangle 8"/>
+            <p:cNvSpPr/>
+            <p:nvPr/>
+          </p:nvSpPr>
+          <p:spPr>
+            <a:xfrm>
+              <a:off x="990600" y="4958080"/>
+              <a:ext cx="2767445" cy="838200"/>
+            </a:xfrm>
+            <a:prstGeom prst="rect">
+              <a:avLst/>
+            </a:prstGeom>
+            <a:solidFill>
+              <a:schemeClr val="accent5">
+                <a:lumMod val="40000"/>
+                <a:lumOff val="60000"/>
+              </a:schemeClr>
+            </a:solidFill>
+            <a:ln>
+              <a:noFill/>
+            </a:ln>
+          </p:spPr>
+          <p:style>
+            <a:lnRef idx="2">
+              <a:schemeClr val="accent1">
+                <a:shade val="50000"/>
+              </a:schemeClr>
+            </a:lnRef>
+            <a:fillRef idx="1">
+              <a:schemeClr val="accent1"/>
+            </a:fillRef>
+            <a:effectRef idx="0">
+              <a:schemeClr val="accent1"/>
+            </a:effectRef>
+            <a:fontRef idx="minor">
+              <a:schemeClr val="lt1"/>
+            </a:fontRef>
+          </p:style>
+          <p:txBody>
+            <a:bodyPr rtlCol="0" anchor="ctr"/>
+            <a:lstStyle/>
+            <a:p>
+              <a:pPr algn="ctr"/>
+              <a:r>
+                <a:rPr lang="en-US" sz="4400" dirty="0" smtClean="0">
+                  <a:solidFill>
+                    <a:schemeClr val="tx1"/>
+                  </a:solidFill>
+                  <a:latin typeface="Calibri" panose="020F0502020204030204" pitchFamily="34" charset="0"/>
+                  <a:cs typeface="Calibri" panose="020F0502020204030204" pitchFamily="34" charset="0"/>
+                </a:rPr>
+                <a:t>1</a:t>
+              </a:r>
+            </a:p>
+          </p:txBody>
+        </p:sp>
+      </p:grpSp>
+      <p:grpSp>
+        <p:nvGrpSpPr>
+          <p:cNvPr id="12" name="Group 11"/>
+          <p:cNvGrpSpPr/>
+          <p:nvPr/>
+        </p:nvGrpSpPr>
+        <p:grpSpPr>
+          <a:xfrm>
+            <a:off x="5410199" y="1676400"/>
+            <a:ext cx="2767446" cy="4119880"/>
+            <a:chOff x="5410199" y="1676400"/>
+            <a:chExt cx="2767446" cy="4119880"/>
+          </a:xfrm>
+        </p:grpSpPr>
+        <p:sp>
+          <p:nvSpPr>
+            <p:cNvPr id="8" name="Rectangle 7"/>
+            <p:cNvSpPr/>
+            <p:nvPr/>
+          </p:nvSpPr>
+          <p:spPr>
+            <a:xfrm>
+              <a:off x="5410200" y="1676400"/>
+              <a:ext cx="2767445" cy="3281680"/>
+            </a:xfrm>
+            <a:prstGeom prst="rect">
+              <a:avLst/>
+            </a:prstGeom>
+            <a:solidFill>
+              <a:schemeClr val="tx1">
+                <a:lumMod val="75000"/>
+                <a:lumOff val="25000"/>
+              </a:schemeClr>
+            </a:solidFill>
+            <a:ln>
+              <a:noFill/>
+            </a:ln>
+          </p:spPr>
+          <p:style>
+            <a:lnRef idx="2">
+              <a:schemeClr val="accent1">
+                <a:shade val="50000"/>
+              </a:schemeClr>
+            </a:lnRef>
+            <a:fillRef idx="1">
+              <a:schemeClr val="accent1"/>
+            </a:fillRef>
+            <a:effectRef idx="0">
+              <a:schemeClr val="accent1"/>
+            </a:effectRef>
+            <a:fontRef idx="minor">
+              <a:schemeClr val="lt1"/>
+            </a:fontRef>
+          </p:style>
+          <p:txBody>
+            <a:bodyPr rtlCol="0" anchor="ctr"/>
+            <a:lstStyle/>
+            <a:p>
+              <a:pPr algn="ctr"/>
+              <a:r>
+                <a:rPr lang="en-US" sz="4000" dirty="0" smtClean="0">
+                  <a:latin typeface="Calibri" panose="020F0502020204030204" pitchFamily="34" charset="0"/>
+                  <a:cs typeface="Calibri" panose="020F0502020204030204" pitchFamily="34" charset="0"/>
+                </a:rPr>
+                <a:t>Definition of done</a:t>
+              </a:r>
+              <a:endParaRPr lang="en-US" sz="4000" dirty="0">
+                <a:latin typeface="Calibri" panose="020F0502020204030204" pitchFamily="34" charset="0"/>
+                <a:cs typeface="Calibri" panose="020F0502020204030204" pitchFamily="34" charset="0"/>
+              </a:endParaRPr>
+            </a:p>
+          </p:txBody>
+        </p:sp>
+        <p:sp>
+          <p:nvSpPr>
+            <p:cNvPr id="11" name="Rectangle 10"/>
+            <p:cNvSpPr/>
+            <p:nvPr/>
+          </p:nvSpPr>
+          <p:spPr>
+            <a:xfrm>
+              <a:off x="5410199" y="4958080"/>
+              <a:ext cx="2767445" cy="838200"/>
+            </a:xfrm>
+            <a:prstGeom prst="rect">
+              <a:avLst/>
+            </a:prstGeom>
+            <a:solidFill>
+              <a:schemeClr val="accent6">
+                <a:lumMod val="40000"/>
+                <a:lumOff val="60000"/>
+              </a:schemeClr>
+            </a:solidFill>
+            <a:ln>
+              <a:noFill/>
+            </a:ln>
+          </p:spPr>
+          <p:style>
+            <a:lnRef idx="2">
+              <a:schemeClr val="accent1">
+                <a:shade val="50000"/>
+              </a:schemeClr>
+            </a:lnRef>
+            <a:fillRef idx="1">
+              <a:schemeClr val="accent1"/>
+            </a:fillRef>
+            <a:effectRef idx="0">
+              <a:schemeClr val="accent1"/>
+            </a:effectRef>
+            <a:fontRef idx="minor">
+              <a:schemeClr val="lt1"/>
+            </a:fontRef>
+          </p:style>
+          <p:txBody>
+            <a:bodyPr rtlCol="0" anchor="ctr"/>
+            <a:lstStyle/>
+            <a:p>
+              <a:pPr algn="ctr"/>
+              <a:r>
+                <a:rPr lang="en-US" sz="4400" dirty="0">
+                  <a:solidFill>
+                    <a:schemeClr val="tx1"/>
+                  </a:solidFill>
+                  <a:latin typeface="Calibri" panose="020F0502020204030204" pitchFamily="34" charset="0"/>
+                  <a:cs typeface="Calibri" panose="020F0502020204030204" pitchFamily="34" charset="0"/>
+                </a:rPr>
+                <a:t>2</a:t>
+              </a:r>
+              <a:endParaRPr lang="en-US" sz="4400" dirty="0" smtClean="0">
+                <a:solidFill>
+                  <a:schemeClr val="tx1"/>
+                </a:solidFill>
+                <a:latin typeface="Calibri" panose="020F0502020204030204" pitchFamily="34" charset="0"/>
+                <a:cs typeface="Calibri" panose="020F0502020204030204" pitchFamily="34" charset="0"/>
+              </a:endParaRPr>
+            </a:p>
+          </p:txBody>
+        </p:sp>
+      </p:grpSp>
+    </p:spTree>
+    <p:extLst>
+      <p:ext uri="{BB962C8B-B14F-4D97-AF65-F5344CB8AC3E}">
+        <p14:creationId xmlns:p14="http://schemas.microsoft.com/office/powerpoint/2010/main" val="3912627328"/>
+      </p:ext>
+    </p:extLst>
+  </p:cSld>
+  <p:clrMapOvr>
+    <a:masterClrMapping/>
+  </p:clrMapOvr>
+  <p:timing>
+    <p:tnLst>
+      <p:par>
+        <p:cTn id="1" dur="indefinite" restart="never" nodeType="tmRoot"/>
+      </p:par>
+    </p:tnLst>
+  </p:timing>
+</p:sld>
+</file>
+
+<file path=ppt/slides/slide3.xml><?xml version="1.0" encoding="utf-8"?>
+<p:sld xmlns:a="http://schemas.openxmlformats.org/drawingml/2006/main" xmlns:r="http://schemas.openxmlformats.org/officeDocument/2006/relationships" xmlns:p="http://schemas.openxmlformats.org/presentationml/2006/main" showMasterSp="0">
+  <p:cSld>
+    <p:spTree>
+      <p:nvGrpSpPr>
+        <p:cNvPr id="1" name=""/>
+        <p:cNvGrpSpPr/>
+        <p:nvPr/>
+      </p:nvGrpSpPr>
+      <p:grpSpPr>
+        <a:xfrm>
+          <a:off x="0" y="0"/>
+          <a:ext cx="0" cy="0"/>
+          <a:chOff x="0" y="0"/>
+          <a:chExt cx="0" cy="0"/>
+        </a:xfrm>
+      </p:grpSpPr>
+      <p:sp>
+        <p:nvSpPr>
+          <p:cNvPr id="3" name="TextBox 2"/>
+          <p:cNvSpPr txBox="1"/>
+          <p:nvPr/>
+        </p:nvSpPr>
+        <p:spPr>
+          <a:xfrm>
+            <a:off x="0" y="0"/>
+            <a:ext cx="9144000" cy="584775"/>
+          </a:xfrm>
+          <a:prstGeom prst="rect">
+            <a:avLst/>
+          </a:prstGeom>
+          <a:solidFill>
+            <a:schemeClr val="accent1">
+              <a:lumMod val="20000"/>
+              <a:lumOff val="80000"/>
+            </a:schemeClr>
+          </a:solidFill>
+        </p:spPr>
+        <p:txBody>
+          <a:bodyPr wrap="square" rtlCol="0">
+            <a:spAutoFit/>
+          </a:bodyPr>
+          <a:lstStyle/>
+          <a:p>
+            <a:pPr algn="ctr"/>
+            <a:r>
+              <a:rPr lang="en-US" sz="3200" b="1" dirty="0" smtClean="0">
+                <a:latin typeface="Calibri" panose="020F0502020204030204" pitchFamily="34" charset="0"/>
+                <a:cs typeface="Calibri" panose="020F0502020204030204" pitchFamily="34" charset="0"/>
+              </a:rPr>
+              <a:t>Sprint goals</a:t>
+            </a:r>
+            <a:endParaRPr lang="en-US" sz="3200" b="1" dirty="0">
+              <a:latin typeface="Calibri" panose="020F0502020204030204" pitchFamily="34" charset="0"/>
+              <a:cs typeface="Calibri" panose="020F0502020204030204" pitchFamily="34" charset="0"/>
+            </a:endParaRPr>
+          </a:p>
+        </p:txBody>
+      </p:sp>
+      <p:grpSp>
+        <p:nvGrpSpPr>
+          <p:cNvPr id="10" name="Group 9"/>
+          <p:cNvGrpSpPr/>
+          <p:nvPr/>
+        </p:nvGrpSpPr>
+        <p:grpSpPr>
+          <a:xfrm>
+            <a:off x="1295401" y="1437409"/>
+            <a:ext cx="6286500" cy="838200"/>
+            <a:chOff x="-1877291" y="1905000"/>
+            <a:chExt cx="5534892" cy="838200"/>
+          </a:xfrm>
+        </p:grpSpPr>
+        <p:sp>
+          <p:nvSpPr>
+            <p:cNvPr id="4" name="Rectangle 3"/>
+            <p:cNvSpPr/>
+            <p:nvPr/>
+          </p:nvSpPr>
+          <p:spPr>
+            <a:xfrm>
+              <a:off x="-493568" y="1905000"/>
+              <a:ext cx="4151169" cy="838200"/>
+            </a:xfrm>
+            <a:prstGeom prst="rect">
+              <a:avLst/>
+            </a:prstGeom>
+            <a:solidFill>
+              <a:schemeClr val="bg2">
+                <a:lumMod val="75000"/>
+              </a:schemeClr>
+            </a:solidFill>
+            <a:ln>
+              <a:noFill/>
+            </a:ln>
+          </p:spPr>
+          <p:style>
+            <a:lnRef idx="2">
+              <a:schemeClr val="accent1">
+                <a:shade val="50000"/>
+              </a:schemeClr>
+            </a:lnRef>
+            <a:fillRef idx="1">
+              <a:schemeClr val="accent1"/>
+            </a:fillRef>
+            <a:effectRef idx="0">
+              <a:schemeClr val="accent1"/>
+            </a:effectRef>
+            <a:fontRef idx="minor">
+              <a:schemeClr val="lt1"/>
+            </a:fontRef>
+          </p:style>
+          <p:txBody>
+            <a:bodyPr rtlCol="0" anchor="ctr"/>
+            <a:lstStyle/>
+            <a:p>
+              <a:pPr algn="ctr"/>
+              <a:r>
+                <a:rPr lang="en-US" sz="2800" dirty="0" smtClean="0">
+                  <a:latin typeface="Calibri" panose="020F0502020204030204" pitchFamily="34" charset="0"/>
+                  <a:cs typeface="Calibri" panose="020F0502020204030204" pitchFamily="34" charset="0"/>
+                </a:rPr>
+                <a:t>Research</a:t>
+              </a:r>
+              <a:endParaRPr lang="en-US" sz="2800" dirty="0">
+                <a:latin typeface="Calibri" panose="020F0502020204030204" pitchFamily="34" charset="0"/>
+                <a:cs typeface="Calibri" panose="020F0502020204030204" pitchFamily="34" charset="0"/>
+              </a:endParaRPr>
+            </a:p>
+          </p:txBody>
+        </p:sp>
+        <p:sp>
+          <p:nvSpPr>
+            <p:cNvPr id="9" name="Rectangle 8"/>
+            <p:cNvSpPr/>
+            <p:nvPr/>
+          </p:nvSpPr>
+          <p:spPr>
+            <a:xfrm>
+              <a:off x="-1877291" y="1905000"/>
+              <a:ext cx="1383723" cy="838200"/>
+            </a:xfrm>
+            <a:prstGeom prst="rect">
+              <a:avLst/>
+            </a:prstGeom>
+            <a:solidFill>
+              <a:schemeClr val="bg2">
+                <a:lumMod val="90000"/>
+              </a:schemeClr>
+            </a:solidFill>
+            <a:ln>
+              <a:noFill/>
+            </a:ln>
+          </p:spPr>
+          <p:style>
+            <a:lnRef idx="2">
+              <a:schemeClr val="accent1">
+                <a:shade val="50000"/>
+              </a:schemeClr>
+            </a:lnRef>
+            <a:fillRef idx="1">
+              <a:schemeClr val="accent1"/>
+            </a:fillRef>
+            <a:effectRef idx="0">
+              <a:schemeClr val="accent1"/>
+            </a:effectRef>
+            <a:fontRef idx="minor">
+              <a:schemeClr val="lt1"/>
+            </a:fontRef>
+          </p:style>
+          <p:txBody>
+            <a:bodyPr rtlCol="0" anchor="ctr"/>
+            <a:lstStyle/>
+            <a:p>
+              <a:pPr algn="ctr"/>
+              <a:r>
+                <a:rPr lang="en-US" sz="4400" dirty="0" smtClean="0">
+                  <a:solidFill>
+                    <a:schemeClr val="tx1"/>
+                  </a:solidFill>
+                  <a:latin typeface="Calibri" panose="020F0502020204030204" pitchFamily="34" charset="0"/>
+                  <a:cs typeface="Calibri" panose="020F0502020204030204" pitchFamily="34" charset="0"/>
+                </a:rPr>
+                <a:t>1</a:t>
+              </a:r>
+            </a:p>
+          </p:txBody>
+        </p:sp>
+      </p:grpSp>
+      <p:sp>
+        <p:nvSpPr>
+          <p:cNvPr id="14" name="Rectangle 13"/>
+          <p:cNvSpPr/>
+          <p:nvPr/>
+        </p:nvSpPr>
+        <p:spPr>
+          <a:xfrm>
+            <a:off x="2867026" y="2504209"/>
+            <a:ext cx="4714875" cy="838200"/>
+          </a:xfrm>
+          <a:prstGeom prst="rect">
+            <a:avLst/>
+          </a:prstGeom>
+          <a:solidFill>
+            <a:schemeClr val="bg2">
+              <a:lumMod val="50000"/>
+            </a:schemeClr>
+          </a:solidFill>
+          <a:ln>
+            <a:noFill/>
+          </a:ln>
+        </p:spPr>
+        <p:style>
+          <a:lnRef idx="2">
+            <a:schemeClr val="accent1">
+              <a:shade val="50000"/>
+            </a:schemeClr>
+          </a:lnRef>
+          <a:fillRef idx="1">
+            <a:schemeClr val="accent1"/>
+          </a:fillRef>
+          <a:effectRef idx="0">
+            <a:schemeClr val="accent1"/>
+          </a:effectRef>
+          <a:fontRef idx="minor">
+            <a:schemeClr val="lt1"/>
+          </a:fontRef>
+        </p:style>
+        <p:txBody>
+          <a:bodyPr rtlCol="0" anchor="ctr"/>
+          <a:lstStyle/>
+          <a:p>
+            <a:pPr algn="ctr"/>
+            <a:r>
+              <a:rPr lang="en-US" sz="2800" dirty="0" smtClean="0">
+                <a:latin typeface="Calibri" panose="020F0502020204030204" pitchFamily="34" charset="0"/>
+                <a:cs typeface="Calibri" panose="020F0502020204030204" pitchFamily="34" charset="0"/>
+              </a:rPr>
+              <a:t>Registration</a:t>
+            </a:r>
+            <a:endParaRPr lang="en-US" sz="2800" dirty="0">
+              <a:latin typeface="Calibri" panose="020F0502020204030204" pitchFamily="34" charset="0"/>
+              <a:cs typeface="Calibri" panose="020F0502020204030204" pitchFamily="34" charset="0"/>
+            </a:endParaRPr>
+          </a:p>
+        </p:txBody>
+      </p:sp>
+      <p:sp>
+        <p:nvSpPr>
+          <p:cNvPr id="16" name="Rectangle 15"/>
+          <p:cNvSpPr/>
+          <p:nvPr/>
+        </p:nvSpPr>
+        <p:spPr>
+          <a:xfrm>
+            <a:off x="2867026" y="3564082"/>
+            <a:ext cx="4714875" cy="838200"/>
+          </a:xfrm>
+          <a:prstGeom prst="rect">
+            <a:avLst/>
+          </a:prstGeom>
+          <a:solidFill>
+            <a:schemeClr val="bg2">
+              <a:lumMod val="25000"/>
+            </a:schemeClr>
+          </a:solidFill>
+          <a:ln>
+            <a:noFill/>
+          </a:ln>
+        </p:spPr>
+        <p:style>
+          <a:lnRef idx="2">
+            <a:schemeClr val="accent1">
+              <a:shade val="50000"/>
+            </a:schemeClr>
+          </a:lnRef>
+          <a:fillRef idx="1">
+            <a:schemeClr val="accent1"/>
+          </a:fillRef>
+          <a:effectRef idx="0">
+            <a:schemeClr val="accent1"/>
+          </a:effectRef>
+          <a:fontRef idx="minor">
+            <a:schemeClr val="lt1"/>
+          </a:fontRef>
+        </p:style>
+        <p:txBody>
+          <a:bodyPr rtlCol="0" anchor="ctr"/>
+          <a:lstStyle/>
+          <a:p>
+            <a:pPr algn="ctr"/>
+            <a:r>
+              <a:rPr lang="en-US" sz="2800" dirty="0" smtClean="0">
+                <a:latin typeface="Calibri" panose="020F0502020204030204" pitchFamily="34" charset="0"/>
+                <a:cs typeface="Calibri" panose="020F0502020204030204" pitchFamily="34" charset="0"/>
+              </a:rPr>
+              <a:t>Call setup</a:t>
+            </a:r>
+            <a:endParaRPr lang="en-US" sz="2800" dirty="0">
+              <a:latin typeface="Calibri" panose="020F0502020204030204" pitchFamily="34" charset="0"/>
+              <a:cs typeface="Calibri" panose="020F0502020204030204" pitchFamily="34" charset="0"/>
+            </a:endParaRPr>
+          </a:p>
+        </p:txBody>
+      </p:sp>
+      <p:sp>
+        <p:nvSpPr>
+          <p:cNvPr id="17" name="Rectangle 16"/>
+          <p:cNvSpPr/>
+          <p:nvPr/>
+        </p:nvSpPr>
+        <p:spPr>
+          <a:xfrm>
+            <a:off x="2867026" y="4724400"/>
+            <a:ext cx="4714875" cy="838200"/>
+          </a:xfrm>
+          <a:prstGeom prst="rect">
+            <a:avLst/>
+          </a:prstGeom>
+          <a:solidFill>
+            <a:schemeClr val="tx1">
+              <a:lumMod val="95000"/>
+              <a:lumOff val="5000"/>
+            </a:schemeClr>
+          </a:solidFill>
+          <a:ln>
+            <a:noFill/>
+          </a:ln>
+        </p:spPr>
+        <p:style>
+          <a:lnRef idx="2">
+            <a:schemeClr val="accent1">
+              <a:shade val="50000"/>
+            </a:schemeClr>
+          </a:lnRef>
+          <a:fillRef idx="1">
+            <a:schemeClr val="accent1"/>
+          </a:fillRef>
+          <a:effectRef idx="0">
+            <a:schemeClr val="accent1"/>
+          </a:effectRef>
+          <a:fontRef idx="minor">
+            <a:schemeClr val="lt1"/>
+          </a:fontRef>
+        </p:style>
+        <p:txBody>
+          <a:bodyPr rtlCol="0" anchor="ctr"/>
+          <a:lstStyle/>
+          <a:p>
+            <a:pPr algn="ctr"/>
+            <a:r>
+              <a:rPr lang="en-US" sz="2800" dirty="0" smtClean="0">
+                <a:latin typeface="Calibri" panose="020F0502020204030204" pitchFamily="34" charset="0"/>
+                <a:cs typeface="Calibri" panose="020F0502020204030204" pitchFamily="34" charset="0"/>
+              </a:rPr>
+              <a:t>Call release</a:t>
+            </a:r>
+            <a:endParaRPr lang="en-US" sz="2800" dirty="0">
+              <a:latin typeface="Calibri" panose="020F0502020204030204" pitchFamily="34" charset="0"/>
+              <a:cs typeface="Calibri" panose="020F0502020204030204" pitchFamily="34" charset="0"/>
+            </a:endParaRPr>
+          </a:p>
+        </p:txBody>
+      </p:sp>
+    </p:spTree>
+    <p:extLst>
+      <p:ext uri="{BB962C8B-B14F-4D97-AF65-F5344CB8AC3E}">
+        <p14:creationId xmlns:p14="http://schemas.microsoft.com/office/powerpoint/2010/main" val="114475192"/>
+      </p:ext>
+    </p:extLst>
+  </p:cSld>
+  <p:clrMapOvr>
+    <a:masterClrMapping/>
+  </p:clrMapOvr>
+  <p:timing>
+    <p:tnLst>
+      <p:par>
+        <p:cTn id="1" dur="indefinite" restart="never" nodeType="tmRoot"/>
+      </p:par>
+    </p:tnLst>
+  </p:timing>
+</p:sld>
+</file>
+
+<file path=ppt/slides/slide4.xml><?xml version="1.0" encoding="utf-8"?>
+<p:sld xmlns:a="http://schemas.openxmlformats.org/drawingml/2006/main" xmlns:r="http://schemas.openxmlformats.org/officeDocument/2006/relationships" xmlns:p="http://schemas.openxmlformats.org/presentationml/2006/main" showMasterSp="0">
+  <p:cSld>
+    <p:spTree>
+      <p:nvGrpSpPr>
+        <p:cNvPr id="1" name=""/>
+        <p:cNvGrpSpPr/>
+        <p:nvPr/>
+      </p:nvGrpSpPr>
+      <p:grpSpPr>
+        <a:xfrm>
+          <a:off x="0" y="0"/>
+          <a:ext cx="0" cy="0"/>
+          <a:chOff x="0" y="0"/>
+          <a:chExt cx="0" cy="0"/>
+        </a:xfrm>
+      </p:grpSpPr>
+      <p:sp>
+        <p:nvSpPr>
+          <p:cNvPr id="3" name="TextBox 2"/>
+          <p:cNvSpPr txBox="1"/>
+          <p:nvPr/>
+        </p:nvSpPr>
+        <p:spPr>
+          <a:xfrm>
+            <a:off x="0" y="0"/>
+            <a:ext cx="9144000" cy="584775"/>
+          </a:xfrm>
+          <a:prstGeom prst="rect">
+            <a:avLst/>
+          </a:prstGeom>
+          <a:solidFill>
+            <a:schemeClr val="accent1">
+              <a:lumMod val="20000"/>
+              <a:lumOff val="80000"/>
+            </a:schemeClr>
+          </a:solidFill>
+        </p:spPr>
+        <p:txBody>
+          <a:bodyPr wrap="square" rtlCol="0">
+            <a:spAutoFit/>
+          </a:bodyPr>
+          <a:lstStyle/>
+          <a:p>
+            <a:pPr algn="ctr"/>
+            <a:r>
+              <a:rPr lang="en-US" sz="3200" b="1" dirty="0" smtClean="0">
+                <a:latin typeface="Calibri" panose="020F0502020204030204" pitchFamily="34" charset="0"/>
+                <a:cs typeface="Calibri" panose="020F0502020204030204" pitchFamily="34" charset="0"/>
+              </a:rPr>
+              <a:t>Sprint goals</a:t>
+            </a:r>
+            <a:endParaRPr lang="en-US" sz="3200" b="1" dirty="0">
+              <a:latin typeface="Calibri" panose="020F0502020204030204" pitchFamily="34" charset="0"/>
+              <a:cs typeface="Calibri" panose="020F0502020204030204" pitchFamily="34" charset="0"/>
+            </a:endParaRPr>
+          </a:p>
+        </p:txBody>
+      </p:sp>
+      <p:grpSp>
+        <p:nvGrpSpPr>
+          <p:cNvPr id="10" name="Group 9"/>
+          <p:cNvGrpSpPr/>
+          <p:nvPr/>
+        </p:nvGrpSpPr>
+        <p:grpSpPr>
+          <a:xfrm>
+            <a:off x="1295401" y="1437409"/>
+            <a:ext cx="6286500" cy="838200"/>
+            <a:chOff x="-1877291" y="1905000"/>
+            <a:chExt cx="5534892" cy="838200"/>
+          </a:xfrm>
+        </p:grpSpPr>
+        <p:sp>
+          <p:nvSpPr>
+            <p:cNvPr id="4" name="Rectangle 3"/>
+            <p:cNvSpPr/>
+            <p:nvPr/>
+          </p:nvSpPr>
+          <p:spPr>
+            <a:xfrm>
+              <a:off x="-493568" y="1905000"/>
+              <a:ext cx="4151169" cy="838200"/>
+            </a:xfrm>
+            <a:prstGeom prst="rect">
+              <a:avLst/>
+            </a:prstGeom>
+            <a:solidFill>
+              <a:schemeClr val="accent1">
+                <a:lumMod val="60000"/>
+                <a:lumOff val="40000"/>
+              </a:schemeClr>
+            </a:solidFill>
+            <a:ln>
+              <a:noFill/>
+            </a:ln>
+          </p:spPr>
+          <p:style>
+            <a:lnRef idx="2">
+              <a:schemeClr val="accent1">
+                <a:shade val="50000"/>
+              </a:schemeClr>
+            </a:lnRef>
+            <a:fillRef idx="1">
+              <a:schemeClr val="accent1"/>
+            </a:fillRef>
+            <a:effectRef idx="0">
+              <a:schemeClr val="accent1"/>
+            </a:effectRef>
+            <a:fontRef idx="minor">
+              <a:schemeClr val="lt1"/>
+            </a:fontRef>
+          </p:style>
+          <p:txBody>
+            <a:bodyPr rtlCol="0" anchor="ctr"/>
+            <a:lstStyle/>
+            <a:p>
+              <a:pPr algn="ctr"/>
+              <a:r>
+                <a:rPr lang="en-US" sz="2800" dirty="0" smtClean="0">
+                  <a:solidFill>
+                    <a:schemeClr val="tx1"/>
+                  </a:solidFill>
+                  <a:latin typeface="Calibri" panose="020F0502020204030204" pitchFamily="34" charset="0"/>
+                  <a:cs typeface="Calibri" panose="020F0502020204030204" pitchFamily="34" charset="0"/>
+                </a:rPr>
+                <a:t>Deploy client application</a:t>
+              </a:r>
+              <a:endParaRPr lang="en-US" sz="2800" dirty="0">
+                <a:solidFill>
+                  <a:schemeClr val="tx1"/>
+                </a:solidFill>
+                <a:latin typeface="Calibri" panose="020F0502020204030204" pitchFamily="34" charset="0"/>
+                <a:cs typeface="Calibri" panose="020F0502020204030204" pitchFamily="34" charset="0"/>
+              </a:endParaRPr>
+            </a:p>
+          </p:txBody>
+        </p:sp>
+        <p:sp>
+          <p:nvSpPr>
+            <p:cNvPr id="9" name="Rectangle 8"/>
+            <p:cNvSpPr/>
+            <p:nvPr/>
+          </p:nvSpPr>
+          <p:spPr>
+            <a:xfrm>
+              <a:off x="-1877291" y="1905000"/>
+              <a:ext cx="1383723" cy="838200"/>
+            </a:xfrm>
+            <a:prstGeom prst="rect">
+              <a:avLst/>
+            </a:prstGeom>
+            <a:solidFill>
+              <a:schemeClr val="accent5">
+                <a:lumMod val="40000"/>
+                <a:lumOff val="60000"/>
+              </a:schemeClr>
+            </a:solidFill>
+            <a:ln>
+              <a:noFill/>
+            </a:ln>
+          </p:spPr>
+          <p:style>
+            <a:lnRef idx="2">
+              <a:schemeClr val="accent1">
+                <a:shade val="50000"/>
+              </a:schemeClr>
+            </a:lnRef>
+            <a:fillRef idx="1">
+              <a:schemeClr val="accent1"/>
+            </a:fillRef>
+            <a:effectRef idx="0">
+              <a:schemeClr val="accent1"/>
+            </a:effectRef>
+            <a:fontRef idx="minor">
+              <a:schemeClr val="lt1"/>
+            </a:fontRef>
+          </p:style>
+          <p:txBody>
+            <a:bodyPr rtlCol="0" anchor="ctr"/>
+            <a:lstStyle/>
+            <a:p>
+              <a:pPr algn="ctr"/>
+              <a:r>
+                <a:rPr lang="en-US" sz="4400" dirty="0" smtClean="0">
+                  <a:solidFill>
+                    <a:schemeClr val="tx1"/>
+                  </a:solidFill>
+                  <a:latin typeface="Calibri" panose="020F0502020204030204" pitchFamily="34" charset="0"/>
+                  <a:cs typeface="Calibri" panose="020F0502020204030204" pitchFamily="34" charset="0"/>
+                </a:rPr>
+                <a:t>2</a:t>
+              </a:r>
+            </a:p>
+          </p:txBody>
+        </p:sp>
+      </p:grpSp>
+      <p:sp>
+        <p:nvSpPr>
+          <p:cNvPr id="14" name="Rectangle 13"/>
+          <p:cNvSpPr/>
+          <p:nvPr/>
+        </p:nvSpPr>
+        <p:spPr>
+          <a:xfrm>
+            <a:off x="2867026" y="3664527"/>
+            <a:ext cx="4714875" cy="838200"/>
+          </a:xfrm>
+          <a:prstGeom prst="rect">
+            <a:avLst/>
+          </a:prstGeom>
+          <a:solidFill>
+            <a:schemeClr val="accent2">
+              <a:lumMod val="60000"/>
+              <a:lumOff val="40000"/>
+            </a:schemeClr>
+          </a:solidFill>
+          <a:ln>
+            <a:noFill/>
+          </a:ln>
+        </p:spPr>
+        <p:style>
+          <a:lnRef idx="2">
+            <a:schemeClr val="accent1">
+              <a:shade val="50000"/>
+            </a:schemeClr>
+          </a:lnRef>
+          <a:fillRef idx="1">
+            <a:schemeClr val="accent1"/>
+          </a:fillRef>
+          <a:effectRef idx="0">
+            <a:schemeClr val="accent1"/>
+          </a:effectRef>
+          <a:fontRef idx="minor">
+            <a:schemeClr val="lt1"/>
+          </a:fontRef>
+        </p:style>
+        <p:txBody>
+          <a:bodyPr rtlCol="0" anchor="ctr"/>
+          <a:lstStyle/>
+          <a:p>
+            <a:pPr algn="ctr"/>
+            <a:r>
+              <a:rPr lang="en-US" sz="2800" dirty="0" smtClean="0">
+                <a:latin typeface="Calibri" panose="020F0502020204030204" pitchFamily="34" charset="0"/>
+                <a:cs typeface="Calibri" panose="020F0502020204030204" pitchFamily="34" charset="0"/>
+              </a:rPr>
+              <a:t>Making voice call</a:t>
+            </a:r>
+            <a:endParaRPr lang="en-US" sz="2800" dirty="0">
+              <a:latin typeface="Calibri" panose="020F0502020204030204" pitchFamily="34" charset="0"/>
+              <a:cs typeface="Calibri" panose="020F0502020204030204" pitchFamily="34" charset="0"/>
+            </a:endParaRPr>
+          </a:p>
+        </p:txBody>
+      </p:sp>
+      <p:sp>
+        <p:nvSpPr>
+          <p:cNvPr id="16" name="Rectangle 15"/>
+          <p:cNvSpPr/>
+          <p:nvPr/>
+        </p:nvSpPr>
+        <p:spPr>
+          <a:xfrm>
+            <a:off x="2867026" y="4800600"/>
+            <a:ext cx="4714875" cy="838200"/>
+          </a:xfrm>
+          <a:prstGeom prst="rect">
+            <a:avLst/>
+          </a:prstGeom>
+          <a:solidFill>
+            <a:schemeClr val="accent2">
+              <a:lumMod val="75000"/>
+            </a:schemeClr>
+          </a:solidFill>
+          <a:ln>
+            <a:noFill/>
+          </a:ln>
+        </p:spPr>
+        <p:style>
+          <a:lnRef idx="2">
+            <a:schemeClr val="accent1">
+              <a:shade val="50000"/>
+            </a:schemeClr>
+          </a:lnRef>
+          <a:fillRef idx="1">
+            <a:schemeClr val="accent1"/>
+          </a:fillRef>
+          <a:effectRef idx="0">
+            <a:schemeClr val="accent1"/>
+          </a:effectRef>
+          <a:fontRef idx="minor">
+            <a:schemeClr val="lt1"/>
+          </a:fontRef>
+        </p:style>
+        <p:txBody>
+          <a:bodyPr rtlCol="0" anchor="ctr"/>
+          <a:lstStyle/>
+          <a:p>
+            <a:pPr algn="ctr"/>
+            <a:r>
+              <a:rPr lang="en-US" sz="2800" dirty="0" smtClean="0">
+                <a:latin typeface="Calibri" panose="020F0502020204030204" pitchFamily="34" charset="0"/>
+                <a:cs typeface="Calibri" panose="020F0502020204030204" pitchFamily="34" charset="0"/>
+              </a:rPr>
+              <a:t>Receiving voice call</a:t>
+            </a:r>
+            <a:endParaRPr lang="en-US" sz="2800" dirty="0">
+              <a:latin typeface="Calibri" panose="020F0502020204030204" pitchFamily="34" charset="0"/>
+              <a:cs typeface="Calibri" panose="020F0502020204030204" pitchFamily="34" charset="0"/>
+            </a:endParaRPr>
+          </a:p>
+        </p:txBody>
+      </p:sp>
+      <p:sp>
+        <p:nvSpPr>
+          <p:cNvPr id="17" name="Rectangle 16"/>
+          <p:cNvSpPr/>
+          <p:nvPr/>
+        </p:nvSpPr>
+        <p:spPr>
+          <a:xfrm>
+            <a:off x="2867025" y="2552700"/>
+            <a:ext cx="4714875" cy="838200"/>
+          </a:xfrm>
+          <a:prstGeom prst="rect">
+            <a:avLst/>
+          </a:prstGeom>
+          <a:solidFill>
+            <a:schemeClr val="accent1">
+              <a:lumMod val="75000"/>
+            </a:schemeClr>
+          </a:solidFill>
+          <a:ln>
+            <a:noFill/>
+          </a:ln>
+        </p:spPr>
+        <p:style>
+          <a:lnRef idx="2">
+            <a:schemeClr val="accent1">
+              <a:shade val="50000"/>
+            </a:schemeClr>
+          </a:lnRef>
+          <a:fillRef idx="1">
+            <a:schemeClr val="accent1"/>
+          </a:fillRef>
+          <a:effectRef idx="0">
+            <a:schemeClr val="accent1"/>
+          </a:effectRef>
+          <a:fontRef idx="minor">
+            <a:schemeClr val="lt1"/>
+          </a:fontRef>
+        </p:style>
+        <p:txBody>
+          <a:bodyPr rtlCol="0" anchor="ctr"/>
+          <a:lstStyle/>
+          <a:p>
+            <a:pPr algn="ctr"/>
+            <a:r>
+              <a:rPr lang="en-US" sz="2800" dirty="0" smtClean="0">
+                <a:latin typeface="Calibri" panose="020F0502020204030204" pitchFamily="34" charset="0"/>
+                <a:cs typeface="Calibri" panose="020F0502020204030204" pitchFamily="34" charset="0"/>
+              </a:rPr>
+              <a:t>Registration</a:t>
+            </a:r>
+            <a:endParaRPr lang="en-US" sz="2800" dirty="0">
+              <a:latin typeface="Calibri" panose="020F0502020204030204" pitchFamily="34" charset="0"/>
+              <a:cs typeface="Calibri" panose="020F0502020204030204" pitchFamily="34" charset="0"/>
+            </a:endParaRPr>
+          </a:p>
+        </p:txBody>
+      </p:sp>
+    </p:spTree>
+    <p:extLst>
+      <p:ext uri="{BB962C8B-B14F-4D97-AF65-F5344CB8AC3E}">
+        <p14:creationId xmlns:p14="http://schemas.microsoft.com/office/powerpoint/2010/main" val="2215998152"/>
+      </p:ext>
+    </p:extLst>
+  </p:cSld>
+  <p:clrMapOvr>
+    <a:masterClrMapping/>
+  </p:clrMapOvr>
+  <p:timing>
+    <p:tnLst>
+      <p:par>
+        <p:cTn id="1" dur="indefinite" restart="never" nodeType="tmRoot"/>
+      </p:par>
+    </p:tnLst>
+  </p:timing>
+</p:sld>
+</file>
+
+<file path=ppt/slides/slide5.xml><?xml version="1.0" encoding="utf-8"?>
+<p:sld xmlns:a="http://schemas.openxmlformats.org/drawingml/2006/main" xmlns:r="http://schemas.openxmlformats.org/officeDocument/2006/relationships" xmlns:p="http://schemas.openxmlformats.org/presentationml/2006/main" showMasterSp="0">
+  <p:cSld>
+    <p:spTree>
+      <p:nvGrpSpPr>
+        <p:cNvPr id="1" name=""/>
+        <p:cNvGrpSpPr/>
+        <p:nvPr/>
+      </p:nvGrpSpPr>
+      <p:grpSpPr>
+        <a:xfrm>
+          <a:off x="0" y="0"/>
+          <a:ext cx="0" cy="0"/>
+          <a:chOff x="0" y="0"/>
+          <a:chExt cx="0" cy="0"/>
+        </a:xfrm>
+      </p:grpSpPr>
+      <p:sp>
+        <p:nvSpPr>
+          <p:cNvPr id="3" name="TextBox 2"/>
+          <p:cNvSpPr txBox="1"/>
+          <p:nvPr/>
+        </p:nvSpPr>
+        <p:spPr>
+          <a:xfrm>
+            <a:off x="0" y="0"/>
+            <a:ext cx="9144000" cy="584775"/>
+          </a:xfrm>
+          <a:prstGeom prst="rect">
+            <a:avLst/>
+          </a:prstGeom>
+          <a:solidFill>
+            <a:schemeClr val="accent6">
+              <a:lumMod val="60000"/>
+              <a:lumOff val="40000"/>
+            </a:schemeClr>
+          </a:solidFill>
+        </p:spPr>
+        <p:txBody>
+          <a:bodyPr wrap="square" rtlCol="0">
+            <a:spAutoFit/>
+          </a:bodyPr>
+          <a:lstStyle/>
+          <a:p>
+            <a:pPr algn="ctr"/>
+            <a:r>
+              <a:rPr lang="en-US" sz="3200" b="1" dirty="0" smtClean="0">
+                <a:latin typeface="Calibri" panose="020F0502020204030204" pitchFamily="34" charset="0"/>
+                <a:cs typeface="Calibri" panose="020F0502020204030204" pitchFamily="34" charset="0"/>
+              </a:rPr>
+              <a:t>Definition of done</a:t>
+            </a:r>
+            <a:endParaRPr lang="en-US" sz="3200" b="1" dirty="0">
+              <a:latin typeface="Calibri" panose="020F0502020204030204" pitchFamily="34" charset="0"/>
+              <a:cs typeface="Calibri" panose="020F0502020204030204" pitchFamily="34" charset="0"/>
+            </a:endParaRPr>
+          </a:p>
+        </p:txBody>
+      </p:sp>
+      <p:grpSp>
+        <p:nvGrpSpPr>
+          <p:cNvPr id="10" name="Group 9"/>
+          <p:cNvGrpSpPr/>
+          <p:nvPr/>
+        </p:nvGrpSpPr>
+        <p:grpSpPr>
+          <a:xfrm>
+            <a:off x="609600" y="1018309"/>
+            <a:ext cx="7772400" cy="838200"/>
+            <a:chOff x="-1877291" y="1905000"/>
+            <a:chExt cx="5534892" cy="838200"/>
+          </a:xfrm>
+        </p:grpSpPr>
+        <p:sp>
+          <p:nvSpPr>
+            <p:cNvPr id="4" name="Rectangle 3"/>
+            <p:cNvSpPr/>
+            <p:nvPr/>
+          </p:nvSpPr>
+          <p:spPr>
+            <a:xfrm>
+              <a:off x="-846281" y="1905000"/>
+              <a:ext cx="4503882" cy="838200"/>
+            </a:xfrm>
+            <a:prstGeom prst="rect">
+              <a:avLst/>
+            </a:prstGeom>
+            <a:solidFill>
+              <a:schemeClr val="bg2">
+                <a:lumMod val="75000"/>
+              </a:schemeClr>
+            </a:solidFill>
+            <a:ln>
+              <a:noFill/>
+            </a:ln>
+          </p:spPr>
+          <p:style>
+            <a:lnRef idx="2">
+              <a:schemeClr val="accent1">
+                <a:shade val="50000"/>
+              </a:schemeClr>
+            </a:lnRef>
+            <a:fillRef idx="1">
+              <a:schemeClr val="accent1"/>
+            </a:fillRef>
+            <a:effectRef idx="0">
+              <a:schemeClr val="accent1"/>
+            </a:effectRef>
+            <a:fontRef idx="minor">
+              <a:schemeClr val="lt1"/>
+            </a:fontRef>
+          </p:style>
+          <p:txBody>
+            <a:bodyPr rtlCol="0" anchor="ctr"/>
+            <a:lstStyle/>
+            <a:p>
+              <a:pPr algn="ctr"/>
+              <a:r>
+                <a:rPr lang="en-US" sz="2800" dirty="0" smtClean="0">
+                  <a:latin typeface="Calibri" panose="020F0502020204030204" pitchFamily="34" charset="0"/>
+                  <a:cs typeface="Calibri" panose="020F0502020204030204" pitchFamily="34" charset="0"/>
+                </a:rPr>
+                <a:t>Research</a:t>
+              </a:r>
+              <a:endParaRPr lang="en-US" sz="2800" dirty="0">
+                <a:latin typeface="Calibri" panose="020F0502020204030204" pitchFamily="34" charset="0"/>
+                <a:cs typeface="Calibri" panose="020F0502020204030204" pitchFamily="34" charset="0"/>
+              </a:endParaRPr>
+            </a:p>
+          </p:txBody>
+        </p:sp>
+        <p:sp>
+          <p:nvSpPr>
+            <p:cNvPr id="9" name="Rectangle 8"/>
+            <p:cNvSpPr/>
+            <p:nvPr/>
+          </p:nvSpPr>
+          <p:spPr>
+            <a:xfrm>
+              <a:off x="-1877291" y="1905000"/>
+              <a:ext cx="1031010" cy="838200"/>
+            </a:xfrm>
+            <a:prstGeom prst="rect">
+              <a:avLst/>
+            </a:prstGeom>
+            <a:solidFill>
+              <a:schemeClr val="bg2">
+                <a:lumMod val="90000"/>
+              </a:schemeClr>
+            </a:solidFill>
+            <a:ln>
+              <a:noFill/>
+            </a:ln>
+          </p:spPr>
+          <p:style>
+            <a:lnRef idx="2">
+              <a:schemeClr val="accent1">
+                <a:shade val="50000"/>
+              </a:schemeClr>
+            </a:lnRef>
+            <a:fillRef idx="1">
+              <a:schemeClr val="accent1"/>
+            </a:fillRef>
+            <a:effectRef idx="0">
+              <a:schemeClr val="accent1"/>
+            </a:effectRef>
+            <a:fontRef idx="minor">
+              <a:schemeClr val="lt1"/>
+            </a:fontRef>
+          </p:style>
+          <p:txBody>
+            <a:bodyPr rtlCol="0" anchor="ctr"/>
+            <a:lstStyle/>
+            <a:p>
+              <a:pPr algn="ctr"/>
+              <a:r>
+                <a:rPr lang="en-US" sz="4400" dirty="0" smtClean="0">
+                  <a:solidFill>
+                    <a:schemeClr val="tx1"/>
+                  </a:solidFill>
+                  <a:latin typeface="Calibri" panose="020F0502020204030204" pitchFamily="34" charset="0"/>
+                  <a:cs typeface="Calibri" panose="020F0502020204030204" pitchFamily="34" charset="0"/>
+                </a:rPr>
+                <a:t>1</a:t>
+              </a:r>
+            </a:p>
+          </p:txBody>
+        </p:sp>
+      </p:grpSp>
+      <p:sp>
+        <p:nvSpPr>
+          <p:cNvPr id="12" name="Rectangle 11"/>
+          <p:cNvSpPr/>
+          <p:nvPr/>
+        </p:nvSpPr>
+        <p:spPr>
+          <a:xfrm>
+            <a:off x="1524000" y="2694708"/>
+            <a:ext cx="2362200" cy="2867891"/>
+          </a:xfrm>
+          <a:prstGeom prst="rect">
+            <a:avLst/>
+          </a:prstGeom>
+          <a:solidFill>
+            <a:schemeClr val="bg2">
+              <a:lumMod val="50000"/>
+            </a:schemeClr>
+          </a:solidFill>
+          <a:ln>
+            <a:noFill/>
+          </a:ln>
+        </p:spPr>
+        <p:style>
+          <a:lnRef idx="2">
+            <a:schemeClr val="accent1">
+              <a:shade val="50000"/>
+            </a:schemeClr>
+          </a:lnRef>
+          <a:fillRef idx="1">
+            <a:schemeClr val="accent1"/>
+          </a:fillRef>
+          <a:effectRef idx="0">
+            <a:schemeClr val="accent1"/>
+          </a:effectRef>
+          <a:fontRef idx="minor">
+            <a:schemeClr val="lt1"/>
+          </a:fontRef>
+        </p:style>
+        <p:txBody>
+          <a:bodyPr rtlCol="0" anchor="ctr"/>
+          <a:lstStyle/>
+          <a:p>
+            <a:pPr algn="ctr"/>
+            <a:r>
+              <a:rPr lang="en-US" sz="3600" dirty="0" smtClean="0">
+                <a:latin typeface="Calibri" panose="020F0502020204030204" pitchFamily="34" charset="0"/>
+                <a:cs typeface="Calibri" panose="020F0502020204030204" pitchFamily="34" charset="0"/>
+              </a:rPr>
+              <a:t>Scenario</a:t>
+            </a:r>
+            <a:endParaRPr lang="en-US" sz="3600" dirty="0">
+              <a:latin typeface="Calibri" panose="020F0502020204030204" pitchFamily="34" charset="0"/>
+              <a:cs typeface="Calibri" panose="020F0502020204030204" pitchFamily="34" charset="0"/>
+            </a:endParaRPr>
+          </a:p>
+        </p:txBody>
+      </p:sp>
+      <p:sp>
+        <p:nvSpPr>
+          <p:cNvPr id="15" name="Rectangle 14"/>
+          <p:cNvSpPr/>
+          <p:nvPr/>
+        </p:nvSpPr>
+        <p:spPr>
+          <a:xfrm>
+            <a:off x="5226627" y="2694708"/>
+            <a:ext cx="2362200" cy="2867891"/>
+          </a:xfrm>
+          <a:prstGeom prst="rect">
+            <a:avLst/>
+          </a:prstGeom>
+          <a:solidFill>
+            <a:schemeClr val="tx1">
+              <a:lumMod val="75000"/>
+              <a:lumOff val="25000"/>
+            </a:schemeClr>
+          </a:solidFill>
+          <a:ln>
+            <a:noFill/>
+          </a:ln>
+        </p:spPr>
+        <p:style>
+          <a:lnRef idx="2">
+            <a:schemeClr val="accent1">
+              <a:shade val="50000"/>
+            </a:schemeClr>
+          </a:lnRef>
+          <a:fillRef idx="1">
+            <a:schemeClr val="accent1"/>
+          </a:fillRef>
+          <a:effectRef idx="0">
+            <a:schemeClr val="accent1"/>
+          </a:effectRef>
+          <a:fontRef idx="minor">
+            <a:schemeClr val="lt1"/>
+          </a:fontRef>
+        </p:style>
+        <p:txBody>
+          <a:bodyPr rtlCol="0" anchor="ctr"/>
+          <a:lstStyle/>
+          <a:p>
+            <a:pPr algn="ctr"/>
+            <a:r>
+              <a:rPr lang="en-US" sz="3200" dirty="0" err="1" smtClean="0">
+                <a:latin typeface="Calibri" panose="020F0502020204030204" pitchFamily="34" charset="0"/>
+                <a:cs typeface="Calibri" panose="020F0502020204030204" pitchFamily="34" charset="0"/>
+              </a:rPr>
+              <a:t>SIPp</a:t>
+            </a:r>
+            <a:endParaRPr lang="en-US" sz="3200" dirty="0" smtClean="0">
+              <a:latin typeface="Calibri" panose="020F0502020204030204" pitchFamily="34" charset="0"/>
+              <a:cs typeface="Calibri" panose="020F0502020204030204" pitchFamily="34" charset="0"/>
+            </a:endParaRPr>
+          </a:p>
+          <a:p>
+            <a:pPr algn="ctr"/>
+            <a:r>
+              <a:rPr lang="en-US" sz="3200" dirty="0">
+                <a:latin typeface="Calibri" panose="020F0502020204030204" pitchFamily="34" charset="0"/>
+                <a:cs typeface="Calibri" panose="020F0502020204030204" pitchFamily="34" charset="0"/>
+              </a:rPr>
+              <a:t>t</a:t>
+            </a:r>
+            <a:r>
+              <a:rPr lang="en-US" sz="3200" dirty="0" smtClean="0">
+                <a:latin typeface="Calibri" panose="020F0502020204030204" pitchFamily="34" charset="0"/>
+                <a:cs typeface="Calibri" panose="020F0502020204030204" pitchFamily="34" charset="0"/>
+              </a:rPr>
+              <a:t>est complete</a:t>
+            </a:r>
+            <a:endParaRPr lang="en-US" sz="3200" dirty="0">
+              <a:latin typeface="Calibri" panose="020F0502020204030204" pitchFamily="34" charset="0"/>
+              <a:cs typeface="Calibri" panose="020F0502020204030204" pitchFamily="34" charset="0"/>
+            </a:endParaRPr>
+          </a:p>
+        </p:txBody>
+      </p:sp>
+    </p:spTree>
+    <p:extLst>
+      <p:ext uri="{BB962C8B-B14F-4D97-AF65-F5344CB8AC3E}">
+        <p14:creationId xmlns:p14="http://schemas.microsoft.com/office/powerpoint/2010/main" val="1138892160"/>
+      </p:ext>
+    </p:extLst>
+  </p:cSld>
+  <p:clrMapOvr>
+    <a:masterClrMapping/>
+  </p:clrMapOvr>
+  <p:timing>
+    <p:tnLst>
+      <p:par>
+        <p:cTn id="1" dur="indefinite" restart="never" nodeType="tmRoot"/>
+      </p:par>
+    </p:tnLst>
+  </p:timing>
+</p:sld>
+</file>
+
+<file path=ppt/slides/slide6.xml><?xml version="1.0" encoding="utf-8"?>
+<p:sld xmlns:a="http://schemas.openxmlformats.org/drawingml/2006/main" xmlns:r="http://schemas.openxmlformats.org/officeDocument/2006/relationships" xmlns:p="http://schemas.openxmlformats.org/presentationml/2006/main" showMasterSp="0">
+  <p:cSld>
+    <p:spTree>
+      <p:nvGrpSpPr>
+        <p:cNvPr id="1" name=""/>
+        <p:cNvGrpSpPr/>
+        <p:nvPr/>
+      </p:nvGrpSpPr>
+      <p:grpSpPr>
+        <a:xfrm>
+          <a:off x="0" y="0"/>
+          <a:ext cx="0" cy="0"/>
+          <a:chOff x="0" y="0"/>
+          <a:chExt cx="0" cy="0"/>
+        </a:xfrm>
+      </p:grpSpPr>
+      <p:sp>
+        <p:nvSpPr>
+          <p:cNvPr id="3" name="TextBox 2"/>
+          <p:cNvSpPr txBox="1"/>
+          <p:nvPr/>
+        </p:nvSpPr>
+        <p:spPr>
+          <a:xfrm>
+            <a:off x="0" y="0"/>
+            <a:ext cx="9144000" cy="584775"/>
+          </a:xfrm>
+          <a:prstGeom prst="rect">
+            <a:avLst/>
+          </a:prstGeom>
+          <a:solidFill>
+            <a:schemeClr val="accent6">
+              <a:lumMod val="60000"/>
+              <a:lumOff val="40000"/>
+            </a:schemeClr>
+          </a:solidFill>
+        </p:spPr>
+        <p:txBody>
+          <a:bodyPr wrap="square" rtlCol="0">
+            <a:spAutoFit/>
+          </a:bodyPr>
+          <a:lstStyle/>
+          <a:p>
+            <a:pPr algn="ctr"/>
+            <a:r>
+              <a:rPr lang="en-US" sz="3200" b="1" dirty="0" smtClean="0">
+                <a:latin typeface="Calibri" panose="020F0502020204030204" pitchFamily="34" charset="0"/>
+                <a:cs typeface="Calibri" panose="020F0502020204030204" pitchFamily="34" charset="0"/>
+              </a:rPr>
+              <a:t>Definition of done</a:t>
+            </a:r>
+            <a:endParaRPr lang="en-US" sz="3200" b="1" dirty="0">
+              <a:latin typeface="Calibri" panose="020F0502020204030204" pitchFamily="34" charset="0"/>
+              <a:cs typeface="Calibri" panose="020F0502020204030204" pitchFamily="34" charset="0"/>
+            </a:endParaRPr>
+          </a:p>
+        </p:txBody>
+      </p:sp>
+      <p:grpSp>
+        <p:nvGrpSpPr>
+          <p:cNvPr id="10" name="Group 9"/>
+          <p:cNvGrpSpPr/>
+          <p:nvPr/>
+        </p:nvGrpSpPr>
+        <p:grpSpPr>
+          <a:xfrm>
+            <a:off x="609600" y="1018309"/>
+            <a:ext cx="7772400" cy="838200"/>
+            <a:chOff x="-1877291" y="1905000"/>
+            <a:chExt cx="5534892" cy="838200"/>
+          </a:xfrm>
+        </p:grpSpPr>
+        <p:sp>
+          <p:nvSpPr>
+            <p:cNvPr id="4" name="Rectangle 3"/>
+            <p:cNvSpPr/>
+            <p:nvPr/>
+          </p:nvSpPr>
+          <p:spPr>
+            <a:xfrm>
+              <a:off x="-846281" y="1905000"/>
+              <a:ext cx="4503882" cy="838200"/>
+            </a:xfrm>
+            <a:prstGeom prst="rect">
+              <a:avLst/>
+            </a:prstGeom>
+            <a:solidFill>
+              <a:schemeClr val="accent2">
+                <a:lumMod val="60000"/>
+                <a:lumOff val="40000"/>
+              </a:schemeClr>
+            </a:solidFill>
+            <a:ln>
+              <a:noFill/>
+            </a:ln>
+          </p:spPr>
+          <p:style>
+            <a:lnRef idx="2">
+              <a:schemeClr val="accent1">
+                <a:shade val="50000"/>
+              </a:schemeClr>
+            </a:lnRef>
+            <a:fillRef idx="1">
+              <a:schemeClr val="accent1"/>
+            </a:fillRef>
+            <a:effectRef idx="0">
+              <a:schemeClr val="accent1"/>
+            </a:effectRef>
+            <a:fontRef idx="minor">
+              <a:schemeClr val="lt1"/>
+            </a:fontRef>
+          </p:style>
+          <p:txBody>
+            <a:bodyPr rtlCol="0" anchor="ctr"/>
+            <a:lstStyle/>
+            <a:p>
+              <a:pPr algn="ctr"/>
+              <a:r>
+                <a:rPr lang="en-US" sz="2800" dirty="0" smtClean="0">
+                  <a:latin typeface="Calibri" panose="020F0502020204030204" pitchFamily="34" charset="0"/>
+                  <a:cs typeface="Calibri" panose="020F0502020204030204" pitchFamily="34" charset="0"/>
+                </a:rPr>
+                <a:t>Deploy Registration</a:t>
+              </a:r>
+              <a:endParaRPr lang="en-US" sz="2800" dirty="0">
+                <a:latin typeface="Calibri" panose="020F0502020204030204" pitchFamily="34" charset="0"/>
+                <a:cs typeface="Calibri" panose="020F0502020204030204" pitchFamily="34" charset="0"/>
+              </a:endParaRPr>
+            </a:p>
+          </p:txBody>
+        </p:sp>
+        <p:sp>
+          <p:nvSpPr>
+            <p:cNvPr id="9" name="Rectangle 8"/>
+            <p:cNvSpPr/>
+            <p:nvPr/>
+          </p:nvSpPr>
+          <p:spPr>
+            <a:xfrm>
+              <a:off x="-1877291" y="1905000"/>
+              <a:ext cx="1031010" cy="838200"/>
+            </a:xfrm>
+            <a:prstGeom prst="rect">
+              <a:avLst/>
+            </a:prstGeom>
+            <a:solidFill>
+              <a:schemeClr val="accent2">
+                <a:lumMod val="20000"/>
+                <a:lumOff val="80000"/>
+              </a:schemeClr>
+            </a:solidFill>
+            <a:ln>
+              <a:noFill/>
+            </a:ln>
+          </p:spPr>
+          <p:style>
+            <a:lnRef idx="2">
+              <a:schemeClr val="accent1">
+                <a:shade val="50000"/>
+              </a:schemeClr>
+            </a:lnRef>
+            <a:fillRef idx="1">
+              <a:schemeClr val="accent1"/>
+            </a:fillRef>
+            <a:effectRef idx="0">
+              <a:schemeClr val="accent1"/>
+            </a:effectRef>
+            <a:fontRef idx="minor">
+              <a:schemeClr val="lt1"/>
+            </a:fontRef>
+          </p:style>
+          <p:txBody>
+            <a:bodyPr rtlCol="0" anchor="ctr"/>
+            <a:lstStyle/>
+            <a:p>
+              <a:pPr algn="ctr"/>
+              <a:r>
+                <a:rPr lang="en-US" sz="4400" dirty="0" smtClean="0">
+                  <a:solidFill>
+                    <a:schemeClr val="tx1"/>
+                  </a:solidFill>
+                  <a:latin typeface="Calibri" panose="020F0502020204030204" pitchFamily="34" charset="0"/>
+                  <a:cs typeface="Calibri" panose="020F0502020204030204" pitchFamily="34" charset="0"/>
+                </a:rPr>
+                <a:t>2</a:t>
+              </a:r>
+            </a:p>
+          </p:txBody>
+        </p:sp>
+      </p:grpSp>
+      <p:sp>
+        <p:nvSpPr>
+          <p:cNvPr id="12" name="Rectangle 11"/>
+          <p:cNvSpPr/>
+          <p:nvPr/>
+        </p:nvSpPr>
+        <p:spPr>
+          <a:xfrm>
+            <a:off x="1524000" y="2694708"/>
+            <a:ext cx="2362200" cy="2867891"/>
+          </a:xfrm>
+          <a:prstGeom prst="rect">
+            <a:avLst/>
+          </a:prstGeom>
+          <a:solidFill>
+            <a:schemeClr val="tx1">
+              <a:lumMod val="85000"/>
+              <a:lumOff val="15000"/>
+            </a:schemeClr>
+          </a:solidFill>
+          <a:ln>
+            <a:noFill/>
+          </a:ln>
+        </p:spPr>
+        <p:style>
+          <a:lnRef idx="2">
+            <a:schemeClr val="accent1">
+              <a:shade val="50000"/>
+            </a:schemeClr>
+          </a:lnRef>
+          <a:fillRef idx="1">
+            <a:schemeClr val="accent1"/>
+          </a:fillRef>
+          <a:effectRef idx="0">
+            <a:schemeClr val="accent1"/>
+          </a:effectRef>
+          <a:fontRef idx="minor">
+            <a:schemeClr val="lt1"/>
+          </a:fontRef>
+        </p:style>
+        <p:txBody>
+          <a:bodyPr rtlCol="0" anchor="ctr"/>
+          <a:lstStyle/>
+          <a:p>
+            <a:pPr algn="ctr"/>
+            <a:r>
+              <a:rPr lang="en-US" sz="3200" dirty="0" smtClean="0">
+                <a:latin typeface="Calibri" panose="020F0502020204030204" pitchFamily="34" charset="0"/>
+                <a:cs typeface="Calibri" panose="020F0502020204030204" pitchFamily="34" charset="0"/>
+              </a:rPr>
+              <a:t>Register form and button</a:t>
+            </a:r>
+            <a:endParaRPr lang="en-US" sz="3200" dirty="0">
+              <a:latin typeface="Calibri" panose="020F0502020204030204" pitchFamily="34" charset="0"/>
+              <a:cs typeface="Calibri" panose="020F0502020204030204" pitchFamily="34" charset="0"/>
+            </a:endParaRPr>
+          </a:p>
+        </p:txBody>
+      </p:sp>
+      <p:sp>
+        <p:nvSpPr>
+          <p:cNvPr id="8" name="Rectangle 7"/>
+          <p:cNvSpPr/>
+          <p:nvPr/>
+        </p:nvSpPr>
+        <p:spPr>
+          <a:xfrm>
+            <a:off x="4953000" y="2694707"/>
+            <a:ext cx="2362200" cy="2867892"/>
+          </a:xfrm>
+          <a:prstGeom prst="rect">
+            <a:avLst/>
+          </a:prstGeom>
+          <a:solidFill>
+            <a:schemeClr val="accent4">
+              <a:lumMod val="75000"/>
+            </a:schemeClr>
+          </a:solidFill>
+          <a:ln>
+            <a:noFill/>
+          </a:ln>
+        </p:spPr>
+        <p:style>
+          <a:lnRef idx="2">
+            <a:schemeClr val="accent1">
+              <a:shade val="50000"/>
+            </a:schemeClr>
+          </a:lnRef>
+          <a:fillRef idx="1">
+            <a:schemeClr val="accent1"/>
+          </a:fillRef>
+          <a:effectRef idx="0">
+            <a:schemeClr val="accent1"/>
+          </a:effectRef>
+          <a:fontRef idx="minor">
+            <a:schemeClr val="lt1"/>
+          </a:fontRef>
+        </p:style>
+        <p:txBody>
+          <a:bodyPr rtlCol="0" anchor="ctr"/>
+          <a:lstStyle/>
+          <a:p>
+            <a:pPr algn="ctr"/>
+            <a:r>
+              <a:rPr lang="en-US" sz="3200" dirty="0" smtClean="0">
+                <a:latin typeface="Calibri" panose="020F0502020204030204" pitchFamily="34" charset="0"/>
+                <a:cs typeface="Calibri" panose="020F0502020204030204" pitchFamily="34" charset="0"/>
+              </a:rPr>
+              <a:t>Appear in HSS </a:t>
+            </a:r>
+            <a:endParaRPr lang="en-US" sz="3200" dirty="0">
+              <a:latin typeface="Calibri" panose="020F0502020204030204" pitchFamily="34" charset="0"/>
+              <a:cs typeface="Calibri" panose="020F0502020204030204" pitchFamily="34" charset="0"/>
+            </a:endParaRPr>
+          </a:p>
+        </p:txBody>
+      </p:sp>
+    </p:spTree>
+    <p:extLst>
+      <p:ext uri="{BB962C8B-B14F-4D97-AF65-F5344CB8AC3E}">
+        <p14:creationId xmlns:p14="http://schemas.microsoft.com/office/powerpoint/2010/main" val="805008477"/>
+      </p:ext>
+    </p:extLst>
+  </p:cSld>
+  <p:clrMapOvr>
+    <a:masterClrMapping/>
+  </p:clrMapOvr>
+  <p:timing>
+    <p:tnLst>
+      <p:par>
+        <p:cTn id="1" dur="indefinite" restart="never" nodeType="tmRoot"/>
+      </p:par>
+    </p:tnLst>
+  </p:timing>
+</p:sld>
+</file>
+
+<file path=ppt/slides/slide7.xml><?xml version="1.0" encoding="utf-8"?>
+<p:sld xmlns:a="http://schemas.openxmlformats.org/drawingml/2006/main" xmlns:r="http://schemas.openxmlformats.org/officeDocument/2006/relationships" xmlns:p="http://schemas.openxmlformats.org/presentationml/2006/main" showMasterSp="0">
+  <p:cSld>
+    <p:spTree>
+      <p:nvGrpSpPr>
+        <p:cNvPr id="1" name=""/>
+        <p:cNvGrpSpPr/>
+        <p:nvPr/>
+      </p:nvGrpSpPr>
+      <p:grpSpPr>
+        <a:xfrm>
+          <a:off x="0" y="0"/>
+          <a:ext cx="0" cy="0"/>
+          <a:chOff x="0" y="0"/>
+          <a:chExt cx="0" cy="0"/>
+        </a:xfrm>
+      </p:grpSpPr>
+      <p:sp>
+        <p:nvSpPr>
+          <p:cNvPr id="3" name="TextBox 2"/>
+          <p:cNvSpPr txBox="1"/>
+          <p:nvPr/>
+        </p:nvSpPr>
+        <p:spPr>
+          <a:xfrm>
+            <a:off x="0" y="0"/>
+            <a:ext cx="9144000" cy="584775"/>
+          </a:xfrm>
+          <a:prstGeom prst="rect">
+            <a:avLst/>
+          </a:prstGeom>
+          <a:solidFill>
+            <a:schemeClr val="accent6">
+              <a:lumMod val="60000"/>
+              <a:lumOff val="40000"/>
+            </a:schemeClr>
+          </a:solidFill>
+        </p:spPr>
+        <p:txBody>
+          <a:bodyPr wrap="square" rtlCol="0">
+            <a:spAutoFit/>
+          </a:bodyPr>
+          <a:lstStyle/>
+          <a:p>
+            <a:pPr algn="ctr"/>
+            <a:r>
+              <a:rPr lang="en-US" sz="3200" b="1" dirty="0" smtClean="0">
+                <a:latin typeface="Calibri" panose="020F0502020204030204" pitchFamily="34" charset="0"/>
+                <a:cs typeface="Calibri" panose="020F0502020204030204" pitchFamily="34" charset="0"/>
+              </a:rPr>
+              <a:t>Definition of done</a:t>
+            </a:r>
+            <a:endParaRPr lang="en-US" sz="3200" b="1" dirty="0">
+              <a:latin typeface="Calibri" panose="020F0502020204030204" pitchFamily="34" charset="0"/>
+              <a:cs typeface="Calibri" panose="020F0502020204030204" pitchFamily="34" charset="0"/>
+            </a:endParaRPr>
+          </a:p>
+        </p:txBody>
+      </p:sp>
+      <p:grpSp>
+        <p:nvGrpSpPr>
+          <p:cNvPr id="10" name="Group 9"/>
+          <p:cNvGrpSpPr/>
+          <p:nvPr/>
+        </p:nvGrpSpPr>
+        <p:grpSpPr>
+          <a:xfrm>
+            <a:off x="609600" y="1018309"/>
+            <a:ext cx="7772400" cy="838200"/>
+            <a:chOff x="-1877291" y="1905000"/>
+            <a:chExt cx="5534892" cy="838200"/>
+          </a:xfrm>
+        </p:grpSpPr>
+        <p:sp>
+          <p:nvSpPr>
+            <p:cNvPr id="4" name="Rectangle 3"/>
+            <p:cNvSpPr/>
+            <p:nvPr/>
+          </p:nvSpPr>
+          <p:spPr>
+            <a:xfrm>
+              <a:off x="-846281" y="1905000"/>
+              <a:ext cx="4503882" cy="838200"/>
+            </a:xfrm>
+            <a:prstGeom prst="rect">
+              <a:avLst/>
+            </a:prstGeom>
+            <a:solidFill>
+              <a:schemeClr val="accent3">
+                <a:lumMod val="75000"/>
+              </a:schemeClr>
+            </a:solidFill>
+            <a:ln>
+              <a:noFill/>
+            </a:ln>
+          </p:spPr>
+          <p:style>
+            <a:lnRef idx="2">
+              <a:schemeClr val="accent1">
+                <a:shade val="50000"/>
+              </a:schemeClr>
+            </a:lnRef>
+            <a:fillRef idx="1">
+              <a:schemeClr val="accent1"/>
+            </a:fillRef>
+            <a:effectRef idx="0">
+              <a:schemeClr val="accent1"/>
+            </a:effectRef>
+            <a:fontRef idx="minor">
+              <a:schemeClr val="lt1"/>
+            </a:fontRef>
+          </p:style>
+          <p:txBody>
+            <a:bodyPr rtlCol="0" anchor="ctr"/>
+            <a:lstStyle/>
+            <a:p>
+              <a:pPr algn="ctr"/>
+              <a:r>
+                <a:rPr lang="en-US" sz="2800" dirty="0" smtClean="0">
+                  <a:latin typeface="Calibri" panose="020F0502020204030204" pitchFamily="34" charset="0"/>
+                  <a:cs typeface="Calibri" panose="020F0502020204030204" pitchFamily="34" charset="0"/>
+                </a:rPr>
+                <a:t>Deploy voice call setup and release</a:t>
+              </a:r>
+              <a:endParaRPr lang="en-US" sz="2800" dirty="0">
+                <a:latin typeface="Calibri" panose="020F0502020204030204" pitchFamily="34" charset="0"/>
+                <a:cs typeface="Calibri" panose="020F0502020204030204" pitchFamily="34" charset="0"/>
+              </a:endParaRPr>
+            </a:p>
+          </p:txBody>
+        </p:sp>
+        <p:sp>
+          <p:nvSpPr>
+            <p:cNvPr id="9" name="Rectangle 8"/>
+            <p:cNvSpPr/>
+            <p:nvPr/>
+          </p:nvSpPr>
+          <p:spPr>
+            <a:xfrm>
+              <a:off x="-1877291" y="1905000"/>
+              <a:ext cx="1031010" cy="838200"/>
+            </a:xfrm>
+            <a:prstGeom prst="rect">
+              <a:avLst/>
+            </a:prstGeom>
+            <a:solidFill>
+              <a:schemeClr val="bg1">
+                <a:lumMod val="95000"/>
+              </a:schemeClr>
+            </a:solidFill>
+            <a:ln>
+              <a:noFill/>
+            </a:ln>
+          </p:spPr>
+          <p:style>
+            <a:lnRef idx="2">
+              <a:schemeClr val="accent1">
+                <a:shade val="50000"/>
+              </a:schemeClr>
+            </a:lnRef>
+            <a:fillRef idx="1">
+              <a:schemeClr val="accent1"/>
+            </a:fillRef>
+            <a:effectRef idx="0">
+              <a:schemeClr val="accent1"/>
+            </a:effectRef>
+            <a:fontRef idx="minor">
+              <a:schemeClr val="lt1"/>
+            </a:fontRef>
+          </p:style>
+          <p:txBody>
+            <a:bodyPr rtlCol="0" anchor="ctr"/>
+            <a:lstStyle/>
+            <a:p>
+              <a:pPr algn="ctr"/>
+              <a:r>
+                <a:rPr lang="en-US" sz="4400" dirty="0">
+                  <a:solidFill>
+                    <a:schemeClr val="tx1"/>
+                  </a:solidFill>
+                  <a:latin typeface="Calibri" panose="020F0502020204030204" pitchFamily="34" charset="0"/>
+                  <a:cs typeface="Calibri" panose="020F0502020204030204" pitchFamily="34" charset="0"/>
+                </a:rPr>
+                <a:t>3</a:t>
+              </a:r>
+              <a:endParaRPr lang="en-US" sz="4400" dirty="0" smtClean="0">
+                <a:solidFill>
+                  <a:schemeClr val="tx1"/>
+                </a:solidFill>
+                <a:latin typeface="Calibri" panose="020F0502020204030204" pitchFamily="34" charset="0"/>
+                <a:cs typeface="Calibri" panose="020F0502020204030204" pitchFamily="34" charset="0"/>
+              </a:endParaRPr>
+            </a:p>
+          </p:txBody>
+        </p:sp>
+      </p:grpSp>
+      <p:sp>
+        <p:nvSpPr>
+          <p:cNvPr id="12" name="Rectangle 11"/>
+          <p:cNvSpPr/>
+          <p:nvPr/>
+        </p:nvSpPr>
+        <p:spPr>
+          <a:xfrm>
+            <a:off x="457200" y="2701637"/>
+            <a:ext cx="2362200" cy="1433946"/>
+          </a:xfrm>
+          <a:prstGeom prst="rect">
+            <a:avLst/>
+          </a:prstGeom>
+          <a:solidFill>
+            <a:schemeClr val="bg2">
+              <a:lumMod val="25000"/>
+            </a:schemeClr>
+          </a:solidFill>
+          <a:ln>
+            <a:noFill/>
+          </a:ln>
+        </p:spPr>
+        <p:style>
+          <a:lnRef idx="2">
+            <a:schemeClr val="accent1">
+              <a:shade val="50000"/>
+            </a:schemeClr>
+          </a:lnRef>
+          <a:fillRef idx="1">
+            <a:schemeClr val="accent1"/>
+          </a:fillRef>
+          <a:effectRef idx="0">
+            <a:schemeClr val="accent1"/>
+          </a:effectRef>
+          <a:fontRef idx="minor">
+            <a:schemeClr val="lt1"/>
+          </a:fontRef>
+        </p:style>
+        <p:txBody>
+          <a:bodyPr rtlCol="0" anchor="ctr"/>
+          <a:lstStyle/>
+          <a:p>
+            <a:pPr algn="ctr"/>
+            <a:r>
+              <a:rPr lang="en-US" sz="3200" dirty="0" smtClean="0">
+                <a:latin typeface="Calibri" panose="020F0502020204030204" pitchFamily="34" charset="0"/>
+                <a:cs typeface="Calibri" panose="020F0502020204030204" pitchFamily="34" charset="0"/>
+              </a:rPr>
+              <a:t>Call button</a:t>
+            </a:r>
+            <a:endParaRPr lang="en-US" sz="3200" dirty="0">
+              <a:latin typeface="Calibri" panose="020F0502020204030204" pitchFamily="34" charset="0"/>
+              <a:cs typeface="Calibri" panose="020F0502020204030204" pitchFamily="34" charset="0"/>
+            </a:endParaRPr>
+          </a:p>
+        </p:txBody>
+      </p:sp>
+      <p:sp>
+        <p:nvSpPr>
+          <p:cNvPr id="8" name="Rectangle 7"/>
+          <p:cNvSpPr/>
+          <p:nvPr/>
+        </p:nvSpPr>
+        <p:spPr>
+          <a:xfrm>
+            <a:off x="3505200" y="2701636"/>
+            <a:ext cx="2362200" cy="1433946"/>
+          </a:xfrm>
+          <a:prstGeom prst="rect">
+            <a:avLst/>
+          </a:prstGeom>
+          <a:solidFill>
+            <a:schemeClr val="accent6">
+              <a:lumMod val="75000"/>
+            </a:schemeClr>
+          </a:solidFill>
+          <a:ln>
+            <a:noFill/>
+          </a:ln>
+        </p:spPr>
+        <p:style>
+          <a:lnRef idx="2">
+            <a:schemeClr val="accent1">
+              <a:shade val="50000"/>
+            </a:schemeClr>
+          </a:lnRef>
+          <a:fillRef idx="1">
+            <a:schemeClr val="accent1"/>
+          </a:fillRef>
+          <a:effectRef idx="0">
+            <a:schemeClr val="accent1"/>
+          </a:effectRef>
+          <a:fontRef idx="minor">
+            <a:schemeClr val="lt1"/>
+          </a:fontRef>
+        </p:style>
+        <p:txBody>
+          <a:bodyPr rtlCol="0" anchor="ctr"/>
+          <a:lstStyle/>
+          <a:p>
+            <a:pPr algn="ctr"/>
+            <a:r>
+              <a:rPr lang="en-US" sz="3200" dirty="0" smtClean="0">
+                <a:latin typeface="Calibri" panose="020F0502020204030204" pitchFamily="34" charset="0"/>
+                <a:cs typeface="Calibri" panose="020F0502020204030204" pitchFamily="34" charset="0"/>
+              </a:rPr>
+              <a:t>Make call</a:t>
+            </a:r>
+          </a:p>
+        </p:txBody>
+      </p:sp>
+      <p:sp>
+        <p:nvSpPr>
+          <p:cNvPr id="11" name="Rectangle 10"/>
+          <p:cNvSpPr/>
+          <p:nvPr/>
+        </p:nvSpPr>
+        <p:spPr>
+          <a:xfrm>
+            <a:off x="6400800" y="2701636"/>
+            <a:ext cx="2362200" cy="2867892"/>
+          </a:xfrm>
+          <a:prstGeom prst="rect">
+            <a:avLst/>
+          </a:prstGeom>
+          <a:solidFill>
+            <a:schemeClr val="accent2">
+              <a:lumMod val="75000"/>
+            </a:schemeClr>
+          </a:solidFill>
+          <a:ln>
+            <a:noFill/>
+          </a:ln>
+        </p:spPr>
+        <p:style>
+          <a:lnRef idx="2">
+            <a:schemeClr val="accent1">
+              <a:shade val="50000"/>
+            </a:schemeClr>
+          </a:lnRef>
+          <a:fillRef idx="1">
+            <a:schemeClr val="accent1"/>
+          </a:fillRef>
+          <a:effectRef idx="0">
+            <a:schemeClr val="accent1"/>
+          </a:effectRef>
+          <a:fontRef idx="minor">
+            <a:schemeClr val="lt1"/>
+          </a:fontRef>
+        </p:style>
+        <p:txBody>
+          <a:bodyPr rtlCol="0" anchor="ctr"/>
+          <a:lstStyle/>
+          <a:p>
+            <a:pPr algn="ctr"/>
+            <a:r>
+              <a:rPr lang="en-US" sz="3200" dirty="0" smtClean="0">
+                <a:latin typeface="Calibri" panose="020F0502020204030204" pitchFamily="34" charset="0"/>
+                <a:cs typeface="Calibri" panose="020F0502020204030204" pitchFamily="34" charset="0"/>
+              </a:rPr>
+              <a:t>Transfer voice</a:t>
+            </a:r>
+            <a:endParaRPr lang="en-US" sz="3200" dirty="0">
+              <a:latin typeface="Calibri" panose="020F0502020204030204" pitchFamily="34" charset="0"/>
+              <a:cs typeface="Calibri" panose="020F0502020204030204" pitchFamily="34" charset="0"/>
+            </a:endParaRPr>
+          </a:p>
+        </p:txBody>
+      </p:sp>
+      <p:sp>
+        <p:nvSpPr>
+          <p:cNvPr id="13" name="Rectangle 12"/>
+          <p:cNvSpPr/>
+          <p:nvPr/>
+        </p:nvSpPr>
+        <p:spPr>
+          <a:xfrm>
+            <a:off x="3505200" y="4114800"/>
+            <a:ext cx="2362200" cy="1454727"/>
+          </a:xfrm>
+          <a:prstGeom prst="rect">
+            <a:avLst/>
+          </a:prstGeom>
+          <a:solidFill>
+            <a:schemeClr val="accent4">
+              <a:lumMod val="75000"/>
+            </a:schemeClr>
+          </a:solidFill>
+          <a:ln>
+            <a:noFill/>
+          </a:ln>
+        </p:spPr>
+        <p:style>
+          <a:lnRef idx="2">
+            <a:schemeClr val="accent1">
+              <a:shade val="50000"/>
+            </a:schemeClr>
+          </a:lnRef>
+          <a:fillRef idx="1">
+            <a:schemeClr val="accent1"/>
+          </a:fillRef>
+          <a:effectRef idx="0">
+            <a:schemeClr val="accent1"/>
+          </a:effectRef>
+          <a:fontRef idx="minor">
+            <a:schemeClr val="lt1"/>
+          </a:fontRef>
+        </p:style>
+        <p:txBody>
+          <a:bodyPr rtlCol="0" anchor="ctr"/>
+          <a:lstStyle/>
+          <a:p>
+            <a:pPr algn="ctr"/>
+            <a:r>
+              <a:rPr lang="en-US" sz="3200" dirty="0" smtClean="0">
+                <a:latin typeface="Calibri" panose="020F0502020204030204" pitchFamily="34" charset="0"/>
+                <a:cs typeface="Calibri" panose="020F0502020204030204" pitchFamily="34" charset="0"/>
+              </a:rPr>
+              <a:t>Receive</a:t>
+            </a:r>
+          </a:p>
+          <a:p>
+            <a:pPr algn="ctr"/>
+            <a:r>
+              <a:rPr lang="en-US" sz="3200" dirty="0" smtClean="0">
+                <a:latin typeface="Calibri" panose="020F0502020204030204" pitchFamily="34" charset="0"/>
+                <a:cs typeface="Calibri" panose="020F0502020204030204" pitchFamily="34" charset="0"/>
+              </a:rPr>
+              <a:t>call</a:t>
+            </a:r>
+          </a:p>
+        </p:txBody>
+      </p:sp>
+      <p:sp>
+        <p:nvSpPr>
+          <p:cNvPr id="14" name="Rectangle 13"/>
+          <p:cNvSpPr/>
+          <p:nvPr/>
+        </p:nvSpPr>
+        <p:spPr>
+          <a:xfrm>
+            <a:off x="457200" y="4125190"/>
+            <a:ext cx="2362200" cy="1444338"/>
+          </a:xfrm>
+          <a:prstGeom prst="rect">
+            <a:avLst/>
+          </a:prstGeom>
+          <a:solidFill>
+            <a:schemeClr val="tx2">
+              <a:lumMod val="60000"/>
+              <a:lumOff val="40000"/>
+            </a:schemeClr>
+          </a:solidFill>
+          <a:ln>
+            <a:noFill/>
+          </a:ln>
+        </p:spPr>
+        <p:style>
+          <a:lnRef idx="2">
+            <a:schemeClr val="accent1">
+              <a:shade val="50000"/>
+            </a:schemeClr>
+          </a:lnRef>
+          <a:fillRef idx="1">
+            <a:schemeClr val="accent1"/>
+          </a:fillRef>
+          <a:effectRef idx="0">
+            <a:schemeClr val="accent1"/>
+          </a:effectRef>
+          <a:fontRef idx="minor">
+            <a:schemeClr val="lt1"/>
+          </a:fontRef>
+        </p:style>
+        <p:txBody>
+          <a:bodyPr rtlCol="0" anchor="ctr"/>
+          <a:lstStyle/>
+          <a:p>
+            <a:pPr algn="ctr"/>
+            <a:r>
+              <a:rPr lang="en-US" sz="3200" dirty="0" smtClean="0">
+                <a:latin typeface="Calibri" panose="020F0502020204030204" pitchFamily="34" charset="0"/>
+                <a:cs typeface="Calibri" panose="020F0502020204030204" pitchFamily="34" charset="0"/>
+              </a:rPr>
+              <a:t>Release </a:t>
+            </a:r>
+          </a:p>
+          <a:p>
+            <a:pPr algn="ctr"/>
+            <a:r>
+              <a:rPr lang="en-US" sz="3200" dirty="0" smtClean="0">
+                <a:latin typeface="Calibri" panose="020F0502020204030204" pitchFamily="34" charset="0"/>
+                <a:cs typeface="Calibri" panose="020F0502020204030204" pitchFamily="34" charset="0"/>
+              </a:rPr>
+              <a:t>Call button</a:t>
+            </a:r>
+            <a:endParaRPr lang="en-US" sz="3200" dirty="0">
+              <a:latin typeface="Calibri" panose="020F0502020204030204" pitchFamily="34" charset="0"/>
+              <a:cs typeface="Calibri" panose="020F0502020204030204" pitchFamily="34" charset="0"/>
+            </a:endParaRPr>
+          </a:p>
+        </p:txBody>
+      </p:sp>
+    </p:spTree>
+    <p:extLst>
+      <p:ext uri="{BB962C8B-B14F-4D97-AF65-F5344CB8AC3E}">
+        <p14:creationId xmlns:p14="http://schemas.microsoft.com/office/powerpoint/2010/main" val="3357560837"/>
+      </p:ext>
+    </p:extLst>
+  </p:cSld>
+  <p:clrMapOvr>
+    <a:masterClrMapping/>
+  </p:clrMapOvr>
+  <p:timing>
+    <p:tnLst>
+      <p:par>
+        <p:cTn id="1" dur="indefinite" restart="never" nodeType="tmRoot"/>
+      </p:par>
+    </p:tnLst>
+  </p:timing>
+</p:sld>
+</file>
+
+<file path=ppt/slides/slide8.xml><?xml version="1.0" encoding="utf-8"?>
+<p:sld xmlns:a="http://schemas.openxmlformats.org/drawingml/2006/main" xmlns:r="http://schemas.openxmlformats.org/officeDocument/2006/relationships" xmlns:p="http://schemas.openxmlformats.org/presentationml/2006/main">
+  <p:cSld>
+    <p:spTree>
+      <p:nvGrpSpPr>
+        <p:cNvPr id="1" name=""/>
+        <p:cNvGrpSpPr/>
+        <p:nvPr/>
+      </p:nvGrpSpPr>
+      <p:grpSpPr>
+        <a:xfrm>
+          <a:off x="0" y="0"/>
+          <a:ext cx="0" cy="0"/>
+          <a:chOff x="0" y="0"/>
+          <a:chExt cx="0" cy="0"/>
+        </a:xfrm>
+      </p:grpSpPr>
+      <p:sp>
+        <p:nvSpPr>
+          <p:cNvPr id="2" name="Title 1"/>
+          <p:cNvSpPr>
+            <a:spLocks noGrp="1"/>
+          </p:cNvSpPr>
+          <p:nvPr>
+            <p:ph type="title"/>
+          </p:nvPr>
+        </p:nvSpPr>
+        <p:spPr/>
+        <p:txBody>
+          <a:bodyPr/>
+          <a:lstStyle/>
+          <a:p>
+            <a:endParaRPr lang="en-US"/>
+          </a:p>
+        </p:txBody>
+      </p:sp>
+      <p:sp>
+        <p:nvSpPr>
+          <p:cNvPr id="3" name="Content Placeholder 2"/>
+          <p:cNvSpPr>
+            <a:spLocks noGrp="1"/>
+          </p:cNvSpPr>
+          <p:nvPr>
+            <p:ph idx="1"/>
+          </p:nvPr>
+        </p:nvSpPr>
+        <p:spPr>
+          <a:xfrm>
+            <a:off x="4749552" y="3733800"/>
+            <a:ext cx="3807779" cy="2209799"/>
+          </a:xfrm>
+        </p:spPr>
+        <p:txBody>
+          <a:bodyPr>
+            <a:normAutofit/>
+          </a:bodyPr>
+          <a:lstStyle/>
+          <a:p>
+            <a:r>
+              <a:rPr lang="en-US" sz="6000" dirty="0" smtClean="0">
+                <a:latin typeface="Calibri" panose="020F0502020204030204" pitchFamily="34" charset="0"/>
+                <a:cs typeface="Calibri" panose="020F0502020204030204" pitchFamily="34" charset="0"/>
+              </a:rPr>
+              <a:t>Q&amp;A</a:t>
+            </a:r>
+            <a:endParaRPr lang="en-US" sz="6000" dirty="0">
+              <a:latin typeface="Calibri" panose="020F0502020204030204" pitchFamily="34" charset="0"/>
+              <a:cs typeface="Calibri" panose="020F0502020204030204" pitchFamily="34" charset="0"/>
+            </a:endParaRPr>
+          </a:p>
+        </p:txBody>
+      </p:sp>
+      <p:sp>
+        <p:nvSpPr>
+          <p:cNvPr id="4" name="Text Placeholder 3"/>
+          <p:cNvSpPr>
+            <a:spLocks noGrp="1"/>
+          </p:cNvSpPr>
+          <p:nvPr>
+            <p:ph type="body" sz="half" idx="2"/>
+          </p:nvPr>
+        </p:nvSpPr>
+        <p:spPr/>
+        <p:txBody>
+          <a:bodyPr/>
+          <a:lstStyle/>
+          <a:p>
+            <a:endParaRPr lang="en-US"/>
+          </a:p>
+        </p:txBody>
+      </p:sp>
+    </p:spTree>
+    <p:extLst>
+      <p:ext uri="{BB962C8B-B14F-4D97-AF65-F5344CB8AC3E}">
+        <p14:creationId xmlns:p14="http://schemas.microsoft.com/office/powerpoint/2010/main" val="1926815947"/>
+      </p:ext>
+    </p:extLst>
+  </p:cSld>
+  <p:clrMapOvr>
+    <a:masterClrMapping/>
+  </p:clrMapOvr>
+  <p:timing>
+    <p:tnLst>
+      <p:par>
+        <p:cTn id="1" dur="indefinite" restart="never" nodeType="tmRoot"/>
+      </p:par>
+    </p:tnLst>
+  </p:timing>
+</p:sld>
+</file>
+
+<file path=ppt/slides/slide9.xml><?xml version="1.0" encoding="utf-8"?>
+<p:sld xmlns:a="http://schemas.openxmlformats.org/drawingml/2006/main" xmlns:r="http://schemas.openxmlformats.org/officeDocument/2006/relationships" xmlns:p="http://schemas.openxmlformats.org/presentationml/2006/main">
+  <p:cSld>
+    <p:spTree>
+      <p:nvGrpSpPr>
+        <p:cNvPr id="1" name=""/>
+        <p:cNvGrpSpPr/>
+        <p:nvPr/>
+      </p:nvGrpSpPr>
+      <p:grpSpPr>
+        <a:xfrm>
+          <a:off x="0" y="0"/>
+          <a:ext cx="0" cy="0"/>
+          <a:chOff x="0" y="0"/>
+          <a:chExt cx="0" cy="0"/>
+        </a:xfrm>
+      </p:grpSpPr>
+      <p:sp>
+        <p:nvSpPr>
+          <p:cNvPr id="2" name="Title 1"/>
+          <p:cNvSpPr>
+            <a:spLocks noGrp="1"/>
+          </p:cNvSpPr>
+          <p:nvPr>
+            <p:ph type="title"/>
+          </p:nvPr>
+        </p:nvSpPr>
+        <p:spPr/>
+        <p:txBody>
+          <a:bodyPr/>
+          <a:lstStyle/>
+          <a:p>
+            <a:endParaRPr lang="en-US"/>
+          </a:p>
+        </p:txBody>
+      </p:sp>
+      <p:sp>
+        <p:nvSpPr>
+          <p:cNvPr id="3" name="Content Placeholder 2"/>
+          <p:cNvSpPr>
+            <a:spLocks noGrp="1"/>
+          </p:cNvSpPr>
+          <p:nvPr>
+            <p:ph idx="1"/>
+          </p:nvPr>
+        </p:nvSpPr>
+        <p:spPr>
+          <a:xfrm>
+            <a:off x="4749552" y="3733800"/>
+            <a:ext cx="3807779" cy="2209799"/>
+          </a:xfrm>
+        </p:spPr>
+        <p:txBody>
+          <a:bodyPr>
+            <a:normAutofit/>
+          </a:bodyPr>
+          <a:lstStyle/>
+          <a:p>
+            <a:r>
+              <a:rPr lang="en-US" sz="6000" dirty="0" smtClean="0">
+                <a:latin typeface="Calibri" panose="020F0502020204030204" pitchFamily="34" charset="0"/>
+                <a:cs typeface="Calibri" panose="020F0502020204030204" pitchFamily="34" charset="0"/>
+              </a:rPr>
+              <a:t>Thank you</a:t>
+            </a:r>
+            <a:endParaRPr lang="en-US" sz="6000" dirty="0">
+              <a:latin typeface="Calibri" panose="020F0502020204030204" pitchFamily="34" charset="0"/>
+              <a:cs typeface="Calibri" panose="020F0502020204030204" pitchFamily="34" charset="0"/>
+            </a:endParaRPr>
+          </a:p>
+        </p:txBody>
+      </p:sp>
+      <p:sp>
+        <p:nvSpPr>
+          <p:cNvPr id="4" name="Text Placeholder 3"/>
+          <p:cNvSpPr>
+            <a:spLocks noGrp="1"/>
+          </p:cNvSpPr>
+          <p:nvPr>
+            <p:ph type="body" sz="half" idx="2"/>
+          </p:nvPr>
+        </p:nvSpPr>
+        <p:spPr/>
+        <p:txBody>
+          <a:bodyPr/>
+          <a:lstStyle/>
+          <a:p>
+            <a:endParaRPr lang="en-US"/>
+          </a:p>
+        </p:txBody>
+      </p:sp>
+    </p:spTree>
+    <p:extLst>
+      <p:ext uri="{BB962C8B-B14F-4D97-AF65-F5344CB8AC3E}">
+        <p14:creationId xmlns:p14="http://schemas.microsoft.com/office/powerpoint/2010/main" val="3742788715"/>
+      </p:ext>
+    </p:extLst>
+  </p:cSld>
+  <p:clrMapOvr>
+    <a:masterClrMapping/>
+  </p:clrMapOvr>
+  <p:timing>
+    <p:tnLst>
+      <p:par>
+        <p:cTn id="1" dur="indefinite" restart="never" nodeType="tmRoot"/>
+      </p:par>
+    </p:tnLst>
+  </p:timing>
 </p:sld>
 </file>
 

</xml_diff>